<commit_message>
quelques mises à jour
</commit_message>
<xml_diff>
--- a/Presentation v0.1.pptx
+++ b/Presentation v0.1.pptx
@@ -5,7 +5,7 @@
     <p:sldMasterId id="2147483648" r:id="rId1"/>
   </p:sldMasterIdLst>
   <p:notesMasterIdLst>
-    <p:notesMasterId r:id="rId10"/>
+    <p:notesMasterId r:id="rId20"/>
   </p:notesMasterIdLst>
   <p:sldIdLst>
     <p:sldId id="256" r:id="rId2"/>
@@ -15,7 +15,17 @@
     <p:sldId id="259" r:id="rId6"/>
     <p:sldId id="262" r:id="rId7"/>
     <p:sldId id="260" r:id="rId8"/>
-    <p:sldId id="263" r:id="rId9"/>
+    <p:sldId id="264" r:id="rId9"/>
+    <p:sldId id="273" r:id="rId10"/>
+    <p:sldId id="266" r:id="rId11"/>
+    <p:sldId id="265" r:id="rId12"/>
+    <p:sldId id="267" r:id="rId13"/>
+    <p:sldId id="270" r:id="rId14"/>
+    <p:sldId id="271" r:id="rId15"/>
+    <p:sldId id="272" r:id="rId16"/>
+    <p:sldId id="263" r:id="rId17"/>
+    <p:sldId id="268" r:id="rId18"/>
+    <p:sldId id="269" r:id="rId19"/>
   </p:sldIdLst>
   <p:sldSz cx="9144000" cy="5143500" type="screen16x9"/>
   <p:notesSz cx="6858000" cy="9144000"/>
@@ -199,7 +209,7 @@
           <a:p>
             <a:fld id="{5664853E-F0B3-4049-8118-E699618F3729}" type="datetimeFigureOut">
               <a:rPr lang="en-US" smtClean="0"/>
-              <a:t>1/14/2017</a:t>
+              <a:t>1/23/2017</a:t>
             </a:fld>
             <a:endParaRPr lang="en-US"/>
           </a:p>
@@ -816,7 +826,7 @@
           <a:p>
             <a:fld id="{63DC239A-E497-43C1-AE7B-019BAC3D6E3B}" type="datetimeFigureOut">
               <a:rPr lang="en-US" smtClean="0"/>
-              <a:t>1/14/2017</a:t>
+              <a:t>1/23/2017</a:t>
             </a:fld>
             <a:endParaRPr lang="en-US"/>
           </a:p>
@@ -986,7 +996,7 @@
           <a:p>
             <a:fld id="{63DC239A-E497-43C1-AE7B-019BAC3D6E3B}" type="datetimeFigureOut">
               <a:rPr lang="en-US" smtClean="0"/>
-              <a:t>1/14/2017</a:t>
+              <a:t>1/23/2017</a:t>
             </a:fld>
             <a:endParaRPr lang="en-US"/>
           </a:p>
@@ -1166,7 +1176,7 @@
           <a:p>
             <a:fld id="{63DC239A-E497-43C1-AE7B-019BAC3D6E3B}" type="datetimeFigureOut">
               <a:rPr lang="en-US" smtClean="0"/>
-              <a:t>1/14/2017</a:t>
+              <a:t>1/23/2017</a:t>
             </a:fld>
             <a:endParaRPr lang="en-US"/>
           </a:p>
@@ -1336,7 +1346,7 @@
           <a:p>
             <a:fld id="{63DC239A-E497-43C1-AE7B-019BAC3D6E3B}" type="datetimeFigureOut">
               <a:rPr lang="en-US" smtClean="0"/>
-              <a:t>1/14/2017</a:t>
+              <a:t>1/23/2017</a:t>
             </a:fld>
             <a:endParaRPr lang="en-US"/>
           </a:p>
@@ -1582,7 +1592,7 @@
           <a:p>
             <a:fld id="{63DC239A-E497-43C1-AE7B-019BAC3D6E3B}" type="datetimeFigureOut">
               <a:rPr lang="en-US" smtClean="0"/>
-              <a:t>1/14/2017</a:t>
+              <a:t>1/23/2017</a:t>
             </a:fld>
             <a:endParaRPr lang="en-US"/>
           </a:p>
@@ -1870,7 +1880,7 @@
           <a:p>
             <a:fld id="{63DC239A-E497-43C1-AE7B-019BAC3D6E3B}" type="datetimeFigureOut">
               <a:rPr lang="en-US" smtClean="0"/>
-              <a:t>1/14/2017</a:t>
+              <a:t>1/23/2017</a:t>
             </a:fld>
             <a:endParaRPr lang="en-US"/>
           </a:p>
@@ -2297,7 +2307,7 @@
           <a:p>
             <a:fld id="{63DC239A-E497-43C1-AE7B-019BAC3D6E3B}" type="datetimeFigureOut">
               <a:rPr lang="en-US" smtClean="0"/>
-              <a:t>1/14/2017</a:t>
+              <a:t>1/23/2017</a:t>
             </a:fld>
             <a:endParaRPr lang="en-US"/>
           </a:p>
@@ -2415,7 +2425,7 @@
           <a:p>
             <a:fld id="{63DC239A-E497-43C1-AE7B-019BAC3D6E3B}" type="datetimeFigureOut">
               <a:rPr lang="en-US" smtClean="0"/>
-              <a:t>1/14/2017</a:t>
+              <a:t>1/23/2017</a:t>
             </a:fld>
             <a:endParaRPr lang="en-US"/>
           </a:p>
@@ -2510,7 +2520,7 @@
           <a:p>
             <a:fld id="{63DC239A-E497-43C1-AE7B-019BAC3D6E3B}" type="datetimeFigureOut">
               <a:rPr lang="en-US" smtClean="0"/>
-              <a:t>1/14/2017</a:t>
+              <a:t>1/23/2017</a:t>
             </a:fld>
             <a:endParaRPr lang="en-US"/>
           </a:p>
@@ -2787,7 +2797,7 @@
           <a:p>
             <a:fld id="{63DC239A-E497-43C1-AE7B-019BAC3D6E3B}" type="datetimeFigureOut">
               <a:rPr lang="en-US" smtClean="0"/>
-              <a:t>1/14/2017</a:t>
+              <a:t>1/23/2017</a:t>
             </a:fld>
             <a:endParaRPr lang="en-US"/>
           </a:p>
@@ -3040,7 +3050,7 @@
           <a:p>
             <a:fld id="{63DC239A-E497-43C1-AE7B-019BAC3D6E3B}" type="datetimeFigureOut">
               <a:rPr lang="en-US" smtClean="0"/>
-              <a:t>1/14/2017</a:t>
+              <a:t>1/23/2017</a:t>
             </a:fld>
             <a:endParaRPr lang="en-US"/>
           </a:p>
@@ -3253,7 +3263,7 @@
           <a:p>
             <a:fld id="{63DC239A-E497-43C1-AE7B-019BAC3D6E3B}" type="datetimeFigureOut">
               <a:rPr lang="en-US" smtClean="0"/>
-              <a:t>1/14/2017</a:t>
+              <a:t>1/23/2017</a:t>
             </a:fld>
             <a:endParaRPr lang="en-US"/>
           </a:p>
@@ -3694,6 +3704,1976 @@
 </p:sld>
 </file>
 
+<file path=ppt/slides/slide10.xml><?xml version="1.0" encoding="utf-8"?>
+<p:sld xmlns:a="http://schemas.openxmlformats.org/drawingml/2006/main" xmlns:r="http://schemas.openxmlformats.org/officeDocument/2006/relationships" xmlns:p="http://schemas.openxmlformats.org/presentationml/2006/main">
+  <p:cSld>
+    <p:spTree>
+      <p:nvGrpSpPr>
+        <p:cNvPr id="1" name=""/>
+        <p:cNvGrpSpPr/>
+        <p:nvPr/>
+      </p:nvGrpSpPr>
+      <p:grpSpPr>
+        <a:xfrm>
+          <a:off x="0" y="0"/>
+          <a:ext cx="0" cy="0"/>
+          <a:chOff x="0" y="0"/>
+          <a:chExt cx="0" cy="0"/>
+        </a:xfrm>
+      </p:grpSpPr>
+      <p:sp>
+        <p:nvSpPr>
+          <p:cNvPr id="2" name="Title 1"/>
+          <p:cNvSpPr>
+            <a:spLocks noGrp="1"/>
+          </p:cNvSpPr>
+          <p:nvPr>
+            <p:ph type="title"/>
+          </p:nvPr>
+        </p:nvSpPr>
+        <p:spPr/>
+        <p:txBody>
+          <a:bodyPr/>
+          <a:lstStyle/>
+          <a:p>
+            <a:r>
+              <a:rPr lang="fr-FR" dirty="0"/>
+              <a:t>Modélisation</a:t>
+            </a:r>
+            <a:endParaRPr lang="en-US" dirty="0"/>
+          </a:p>
+        </p:txBody>
+      </p:sp>
+      <p:sp>
+        <p:nvSpPr>
+          <p:cNvPr id="3" name="Content Placeholder 2"/>
+          <p:cNvSpPr>
+            <a:spLocks noGrp="1"/>
+          </p:cNvSpPr>
+          <p:nvPr>
+            <p:ph idx="1"/>
+          </p:nvPr>
+        </p:nvSpPr>
+        <p:spPr/>
+        <p:txBody>
+          <a:bodyPr>
+            <a:normAutofit fontScale="92500" lnSpcReduction="20000"/>
+          </a:bodyPr>
+          <a:lstStyle/>
+          <a:p>
+            <a:r>
+              <a:rPr lang="fr-FR" dirty="0" smtClean="0"/>
+              <a:t>Evaluation des performances:</a:t>
+            </a:r>
+          </a:p>
+          <a:p>
+            <a:pPr lvl="1"/>
+            <a:r>
+              <a:rPr lang="fr-FR" dirty="0" smtClean="0"/>
+              <a:t>Pour l’optimisation du modèle lorsque nécessaire: validation croisée</a:t>
+            </a:r>
+          </a:p>
+          <a:p>
+            <a:pPr lvl="1"/>
+            <a:r>
+              <a:rPr lang="fr-FR" dirty="0" smtClean="0"/>
+              <a:t>Comparaison sur l’ensemble de test:</a:t>
+            </a:r>
+          </a:p>
+          <a:p>
+            <a:pPr lvl="2"/>
+            <a:r>
+              <a:rPr lang="fr-FR" dirty="0" smtClean="0"/>
+              <a:t>Matrice de confusion</a:t>
+            </a:r>
+          </a:p>
+          <a:p>
+            <a:pPr lvl="2"/>
+            <a:r>
+              <a:rPr lang="fr-FR" dirty="0" smtClean="0"/>
+              <a:t>Courbe de ROC &amp; AUC (package </a:t>
+            </a:r>
+            <a:r>
+              <a:rPr lang="fr-FR" dirty="0" err="1" smtClean="0"/>
+              <a:t>pROC</a:t>
+            </a:r>
+            <a:r>
+              <a:rPr lang="fr-FR" dirty="0" smtClean="0"/>
+              <a:t>)</a:t>
+            </a:r>
+          </a:p>
+          <a:p>
+            <a:r>
+              <a:rPr lang="fr-FR" dirty="0" smtClean="0"/>
+              <a:t>Comparaison des modèles:</a:t>
+            </a:r>
+          </a:p>
+          <a:p>
+            <a:pPr lvl="1"/>
+            <a:r>
+              <a:rPr lang="fr-FR" dirty="0" smtClean="0"/>
+              <a:t>Validation sur des données post (prévisions)</a:t>
+            </a:r>
+            <a:endParaRPr lang="en-US" dirty="0"/>
+          </a:p>
+        </p:txBody>
+      </p:sp>
+    </p:spTree>
+    <p:extLst>
+      <p:ext uri="{BB962C8B-B14F-4D97-AF65-F5344CB8AC3E}">
+        <p14:creationId xmlns:p14="http://schemas.microsoft.com/office/powerpoint/2010/main" val="1716365379"/>
+      </p:ext>
+    </p:extLst>
+  </p:cSld>
+  <p:clrMapOvr>
+    <a:masterClrMapping/>
+  </p:clrMapOvr>
+</p:sld>
+</file>
+
+<file path=ppt/slides/slide11.xml><?xml version="1.0" encoding="utf-8"?>
+<p:sld xmlns:a="http://schemas.openxmlformats.org/drawingml/2006/main" xmlns:r="http://schemas.openxmlformats.org/officeDocument/2006/relationships" xmlns:p="http://schemas.openxmlformats.org/presentationml/2006/main">
+  <p:cSld>
+    <p:spTree>
+      <p:nvGrpSpPr>
+        <p:cNvPr id="1" name=""/>
+        <p:cNvGrpSpPr/>
+        <p:nvPr/>
+      </p:nvGrpSpPr>
+      <p:grpSpPr>
+        <a:xfrm>
+          <a:off x="0" y="0"/>
+          <a:ext cx="0" cy="0"/>
+          <a:chOff x="0" y="0"/>
+          <a:chExt cx="0" cy="0"/>
+        </a:xfrm>
+      </p:grpSpPr>
+      <p:sp>
+        <p:nvSpPr>
+          <p:cNvPr id="2" name="Title 1"/>
+          <p:cNvSpPr>
+            <a:spLocks noGrp="1"/>
+          </p:cNvSpPr>
+          <p:nvPr>
+            <p:ph type="title"/>
+          </p:nvPr>
+        </p:nvSpPr>
+        <p:spPr/>
+        <p:txBody>
+          <a:bodyPr/>
+          <a:lstStyle/>
+          <a:p>
+            <a:r>
+              <a:rPr lang="fr-FR" dirty="0" smtClean="0"/>
+              <a:t>Modélisation – Forêts Aléatoires</a:t>
+            </a:r>
+            <a:endParaRPr lang="en-US" dirty="0"/>
+          </a:p>
+        </p:txBody>
+      </p:sp>
+      <p:pic>
+        <p:nvPicPr>
+          <p:cNvPr id="2050" name="Picture 2"/>
+          <p:cNvPicPr>
+            <a:picLocks noChangeAspect="1" noChangeArrowheads="1"/>
+          </p:cNvPicPr>
+          <p:nvPr/>
+        </p:nvPicPr>
+        <p:blipFill>
+          <a:blip r:embed="rId2">
+            <a:extLst>
+              <a:ext uri="{28A0092B-C50C-407E-A947-70E740481C1C}">
+                <a14:useLocalDpi xmlns:a14="http://schemas.microsoft.com/office/drawing/2010/main" val="0"/>
+              </a:ext>
+            </a:extLst>
+          </a:blip>
+          <a:srcRect/>
+          <a:stretch>
+            <a:fillRect/>
+          </a:stretch>
+        </p:blipFill>
+        <p:spPr bwMode="auto">
+          <a:xfrm>
+            <a:off x="179512" y="2031886"/>
+            <a:ext cx="5040000" cy="1764000"/>
+          </a:xfrm>
+          <a:prstGeom prst="rect">
+            <a:avLst/>
+          </a:prstGeom>
+          <a:noFill/>
+          <a:ln>
+            <a:noFill/>
+          </a:ln>
+          <a:extLst>
+            <a:ext uri="{909E8E84-426E-40DD-AFC4-6F175D3DCCD1}">
+              <a14:hiddenFill xmlns:a14="http://schemas.microsoft.com/office/drawing/2010/main">
+                <a:solidFill>
+                  <a:schemeClr val="accent1"/>
+                </a:solidFill>
+              </a14:hiddenFill>
+            </a:ext>
+            <a:ext uri="{91240B29-F687-4F45-9708-019B960494DF}">
+              <a14:hiddenLine xmlns:a14="http://schemas.microsoft.com/office/drawing/2010/main" w="9525">
+                <a:solidFill>
+                  <a:schemeClr val="tx1"/>
+                </a:solidFill>
+                <a:miter lim="800000"/>
+                <a:headEnd/>
+                <a:tailEnd/>
+              </a14:hiddenLine>
+            </a:ext>
+          </a:extLst>
+        </p:spPr>
+      </p:pic>
+      <p:sp>
+        <p:nvSpPr>
+          <p:cNvPr id="5" name="Content Placeholder 2"/>
+          <p:cNvSpPr>
+            <a:spLocks noGrp="1"/>
+          </p:cNvSpPr>
+          <p:nvPr>
+            <p:ph idx="1"/>
+          </p:nvPr>
+        </p:nvSpPr>
+        <p:spPr>
+          <a:xfrm>
+            <a:off x="457200" y="1200151"/>
+            <a:ext cx="8229600" cy="3394472"/>
+          </a:xfrm>
+        </p:spPr>
+        <p:txBody>
+          <a:bodyPr>
+            <a:normAutofit/>
+          </a:bodyPr>
+          <a:lstStyle/>
+          <a:p>
+            <a:r>
+              <a:rPr lang="fr-FR" sz="2000" dirty="0" smtClean="0"/>
+              <a:t>X:</a:t>
+            </a:r>
+            <a:r>
+              <a:rPr lang="fr-FR" sz="2000" dirty="0"/>
+              <a:t> </a:t>
+            </a:r>
+            <a:r>
+              <a:rPr lang="fr-FR" sz="2000" dirty="0" err="1"/>
+              <a:t>available_bikes</a:t>
+            </a:r>
+            <a:r>
+              <a:rPr lang="fr-FR" sz="2000" dirty="0"/>
+              <a:t> </a:t>
+            </a:r>
+            <a:r>
+              <a:rPr lang="fr-FR" sz="2000" dirty="0" smtClean="0"/>
+              <a:t>, seuil=5, prédiction à 3 heures (X=3)</a:t>
+            </a:r>
+          </a:p>
+          <a:p>
+            <a:r>
+              <a:rPr lang="fr-FR" sz="2000" dirty="0" smtClean="0"/>
+              <a:t>Adresse: 8, boulevard Saint Michel (5 stations à moins de 200m)</a:t>
+            </a:r>
+            <a:endParaRPr lang="en-US" sz="1800" dirty="0"/>
+          </a:p>
+        </p:txBody>
+      </p:sp>
+      <p:graphicFrame>
+        <p:nvGraphicFramePr>
+          <p:cNvPr id="4" name="Table 3"/>
+          <p:cNvGraphicFramePr>
+            <a:graphicFrameLocks noGrp="1"/>
+          </p:cNvGraphicFramePr>
+          <p:nvPr>
+            <p:extLst>
+              <p:ext uri="{D42A27DB-BD31-4B8C-83A1-F6EECF244321}">
+                <p14:modId xmlns:p14="http://schemas.microsoft.com/office/powerpoint/2010/main" val="911963193"/>
+              </p:ext>
+            </p:extLst>
+          </p:nvPr>
+        </p:nvGraphicFramePr>
+        <p:xfrm>
+          <a:off x="177089" y="3831141"/>
+          <a:ext cx="3053259" cy="1112520"/>
+        </p:xfrm>
+        <a:graphic>
+          <a:graphicData uri="http://schemas.openxmlformats.org/drawingml/2006/table">
+            <a:tbl>
+              <a:tblPr firstRow="1" bandRow="1">
+                <a:tableStyleId>{5C22544A-7EE6-4342-B048-85BDC9FD1C3A}</a:tableStyleId>
+              </a:tblPr>
+              <a:tblGrid>
+                <a:gridCol w="1017753"/>
+                <a:gridCol w="1017753"/>
+                <a:gridCol w="1017753"/>
+              </a:tblGrid>
+              <a:tr h="370840">
+                <a:tc>
+                  <a:txBody>
+                    <a:bodyPr/>
+                    <a:lstStyle/>
+                    <a:p>
+                      <a:pPr algn="ctr"/>
+                      <a:r>
+                        <a:rPr lang="fr-FR" sz="1100" dirty="0" smtClean="0"/>
+                        <a:t>apprentissage</a:t>
+                      </a:r>
+                      <a:endParaRPr lang="en-US" sz="1100" dirty="0"/>
+                    </a:p>
+                  </a:txBody>
+                  <a:tcPr anchor="ctr"/>
+                </a:tc>
+                <a:tc>
+                  <a:txBody>
+                    <a:bodyPr/>
+                    <a:lstStyle/>
+                    <a:p>
+                      <a:pPr algn="ctr"/>
+                      <a:r>
+                        <a:rPr lang="fr-FR" sz="1100" dirty="0" smtClean="0"/>
+                        <a:t>Prédiction 0</a:t>
+                      </a:r>
+                      <a:endParaRPr lang="en-US" sz="1100" dirty="0"/>
+                    </a:p>
+                  </a:txBody>
+                  <a:tcPr anchor="ctr"/>
+                </a:tc>
+                <a:tc>
+                  <a:txBody>
+                    <a:bodyPr/>
+                    <a:lstStyle/>
+                    <a:p>
+                      <a:pPr algn="ctr"/>
+                      <a:r>
+                        <a:rPr lang="fr-FR" sz="1100" dirty="0" smtClean="0"/>
+                        <a:t>Prédiction 1</a:t>
+                      </a:r>
+                      <a:endParaRPr lang="en-US" sz="1100" dirty="0"/>
+                    </a:p>
+                  </a:txBody>
+                  <a:tcPr anchor="ctr"/>
+                </a:tc>
+              </a:tr>
+              <a:tr h="370840">
+                <a:tc>
+                  <a:txBody>
+                    <a:bodyPr/>
+                    <a:lstStyle/>
+                    <a:p>
+                      <a:pPr algn="ctr"/>
+                      <a:r>
+                        <a:rPr lang="fr-FR" sz="1100" dirty="0" smtClean="0"/>
+                        <a:t>Vrai</a:t>
+                      </a:r>
+                      <a:r>
+                        <a:rPr lang="fr-FR" sz="1100" baseline="0" dirty="0" smtClean="0"/>
+                        <a:t> 0</a:t>
+                      </a:r>
+                      <a:endParaRPr lang="en-US" sz="1100" dirty="0"/>
+                    </a:p>
+                  </a:txBody>
+                  <a:tcPr anchor="ctr"/>
+                </a:tc>
+                <a:tc>
+                  <a:txBody>
+                    <a:bodyPr/>
+                    <a:lstStyle/>
+                    <a:p>
+                      <a:pPr algn="ctr"/>
+                      <a:r>
+                        <a:rPr lang="fr-FR" sz="1100" dirty="0" smtClean="0"/>
+                        <a:t>509</a:t>
+                      </a:r>
+                      <a:endParaRPr lang="en-US" sz="1100" dirty="0"/>
+                    </a:p>
+                  </a:txBody>
+                  <a:tcPr anchor="ctr"/>
+                </a:tc>
+                <a:tc>
+                  <a:txBody>
+                    <a:bodyPr/>
+                    <a:lstStyle/>
+                    <a:p>
+                      <a:pPr algn="ctr"/>
+                      <a:r>
+                        <a:rPr lang="fr-FR" sz="1100" dirty="0" smtClean="0"/>
+                        <a:t>0</a:t>
+                      </a:r>
+                      <a:endParaRPr lang="en-US" sz="1100" dirty="0"/>
+                    </a:p>
+                  </a:txBody>
+                  <a:tcPr anchor="ctr"/>
+                </a:tc>
+              </a:tr>
+              <a:tr h="370840">
+                <a:tc>
+                  <a:txBody>
+                    <a:bodyPr/>
+                    <a:lstStyle/>
+                    <a:p>
+                      <a:pPr algn="ctr"/>
+                      <a:r>
+                        <a:rPr lang="fr-FR" sz="1100" dirty="0" smtClean="0"/>
+                        <a:t>Vrai 1</a:t>
+                      </a:r>
+                      <a:endParaRPr lang="en-US" sz="1100" dirty="0"/>
+                    </a:p>
+                  </a:txBody>
+                  <a:tcPr anchor="ctr"/>
+                </a:tc>
+                <a:tc>
+                  <a:txBody>
+                    <a:bodyPr/>
+                    <a:lstStyle/>
+                    <a:p>
+                      <a:pPr algn="ctr"/>
+                      <a:r>
+                        <a:rPr lang="fr-FR" sz="1100" dirty="0" smtClean="0"/>
+                        <a:t>0</a:t>
+                      </a:r>
+                      <a:endParaRPr lang="en-US" sz="1100" dirty="0"/>
+                    </a:p>
+                  </a:txBody>
+                  <a:tcPr anchor="ctr"/>
+                </a:tc>
+                <a:tc>
+                  <a:txBody>
+                    <a:bodyPr/>
+                    <a:lstStyle/>
+                    <a:p>
+                      <a:pPr algn="ctr"/>
+                      <a:r>
+                        <a:rPr lang="fr-FR" sz="1100" dirty="0" smtClean="0"/>
+                        <a:t>3223</a:t>
+                      </a:r>
+                    </a:p>
+                  </a:txBody>
+                  <a:tcPr anchor="ctr"/>
+                </a:tc>
+              </a:tr>
+            </a:tbl>
+          </a:graphicData>
+        </a:graphic>
+      </p:graphicFrame>
+      <p:graphicFrame>
+        <p:nvGraphicFramePr>
+          <p:cNvPr id="7" name="Table 6"/>
+          <p:cNvGraphicFramePr>
+            <a:graphicFrameLocks noGrp="1"/>
+          </p:cNvGraphicFramePr>
+          <p:nvPr>
+            <p:extLst>
+              <p:ext uri="{D42A27DB-BD31-4B8C-83A1-F6EECF244321}">
+                <p14:modId xmlns:p14="http://schemas.microsoft.com/office/powerpoint/2010/main" val="475531419"/>
+              </p:ext>
+            </p:extLst>
+          </p:nvPr>
+        </p:nvGraphicFramePr>
+        <p:xfrm>
+          <a:off x="3275856" y="3835494"/>
+          <a:ext cx="3053259" cy="1112520"/>
+        </p:xfrm>
+        <a:graphic>
+          <a:graphicData uri="http://schemas.openxmlformats.org/drawingml/2006/table">
+            <a:tbl>
+              <a:tblPr firstRow="1" bandRow="1">
+                <a:tableStyleId>{5C22544A-7EE6-4342-B048-85BDC9FD1C3A}</a:tableStyleId>
+              </a:tblPr>
+              <a:tblGrid>
+                <a:gridCol w="1017753"/>
+                <a:gridCol w="1017753"/>
+                <a:gridCol w="1017753"/>
+              </a:tblGrid>
+              <a:tr h="370840">
+                <a:tc>
+                  <a:txBody>
+                    <a:bodyPr/>
+                    <a:lstStyle/>
+                    <a:p>
+                      <a:pPr algn="ctr"/>
+                      <a:r>
+                        <a:rPr lang="fr-FR" sz="1100" dirty="0" smtClean="0"/>
+                        <a:t>test</a:t>
+                      </a:r>
+                      <a:endParaRPr lang="en-US" sz="1100" dirty="0"/>
+                    </a:p>
+                  </a:txBody>
+                  <a:tcPr anchor="ctr"/>
+                </a:tc>
+                <a:tc>
+                  <a:txBody>
+                    <a:bodyPr/>
+                    <a:lstStyle/>
+                    <a:p>
+                      <a:pPr algn="ctr"/>
+                      <a:r>
+                        <a:rPr lang="fr-FR" sz="1100" dirty="0" smtClean="0"/>
+                        <a:t>Prédiction 0</a:t>
+                      </a:r>
+                      <a:endParaRPr lang="en-US" sz="1100" dirty="0"/>
+                    </a:p>
+                  </a:txBody>
+                  <a:tcPr anchor="ctr"/>
+                </a:tc>
+                <a:tc>
+                  <a:txBody>
+                    <a:bodyPr/>
+                    <a:lstStyle/>
+                    <a:p>
+                      <a:pPr algn="ctr"/>
+                      <a:r>
+                        <a:rPr lang="fr-FR" sz="1100" dirty="0" smtClean="0"/>
+                        <a:t>Prédiction 1</a:t>
+                      </a:r>
+                      <a:endParaRPr lang="en-US" sz="1100" dirty="0"/>
+                    </a:p>
+                  </a:txBody>
+                  <a:tcPr anchor="ctr"/>
+                </a:tc>
+              </a:tr>
+              <a:tr h="370840">
+                <a:tc>
+                  <a:txBody>
+                    <a:bodyPr/>
+                    <a:lstStyle/>
+                    <a:p>
+                      <a:pPr algn="ctr"/>
+                      <a:r>
+                        <a:rPr lang="fr-FR" sz="1100" dirty="0" smtClean="0"/>
+                        <a:t>Vrai</a:t>
+                      </a:r>
+                      <a:r>
+                        <a:rPr lang="fr-FR" sz="1100" baseline="0" dirty="0" smtClean="0"/>
+                        <a:t> 0</a:t>
+                      </a:r>
+                      <a:endParaRPr lang="en-US" sz="1100" dirty="0"/>
+                    </a:p>
+                  </a:txBody>
+                  <a:tcPr anchor="ctr"/>
+                </a:tc>
+                <a:tc>
+                  <a:txBody>
+                    <a:bodyPr/>
+                    <a:lstStyle/>
+                    <a:p>
+                      <a:pPr algn="ctr"/>
+                      <a:r>
+                        <a:rPr lang="fr-FR" sz="1100" dirty="0" smtClean="0"/>
+                        <a:t>464</a:t>
+                      </a:r>
+                      <a:endParaRPr lang="en-US" sz="1100" dirty="0"/>
+                    </a:p>
+                  </a:txBody>
+                  <a:tcPr anchor="ctr"/>
+                </a:tc>
+                <a:tc>
+                  <a:txBody>
+                    <a:bodyPr/>
+                    <a:lstStyle/>
+                    <a:p>
+                      <a:pPr algn="ctr"/>
+                      <a:r>
+                        <a:rPr lang="fr-FR" sz="1100" dirty="0" smtClean="0"/>
+                        <a:t>58</a:t>
+                      </a:r>
+                      <a:endParaRPr lang="en-US" sz="1100" dirty="0"/>
+                    </a:p>
+                  </a:txBody>
+                  <a:tcPr anchor="ctr"/>
+                </a:tc>
+              </a:tr>
+              <a:tr h="370840">
+                <a:tc>
+                  <a:txBody>
+                    <a:bodyPr/>
+                    <a:lstStyle/>
+                    <a:p>
+                      <a:pPr algn="ctr"/>
+                      <a:r>
+                        <a:rPr lang="fr-FR" sz="1100" dirty="0" smtClean="0"/>
+                        <a:t>Vrai 1</a:t>
+                      </a:r>
+                      <a:endParaRPr lang="en-US" sz="1100" dirty="0"/>
+                    </a:p>
+                  </a:txBody>
+                  <a:tcPr anchor="ctr"/>
+                </a:tc>
+                <a:tc>
+                  <a:txBody>
+                    <a:bodyPr/>
+                    <a:lstStyle/>
+                    <a:p>
+                      <a:pPr algn="ctr"/>
+                      <a:r>
+                        <a:rPr lang="fr-FR" sz="1100" dirty="0" smtClean="0"/>
+                        <a:t>7</a:t>
+                      </a:r>
+                      <a:endParaRPr lang="en-US" sz="1100" dirty="0"/>
+                    </a:p>
+                  </a:txBody>
+                  <a:tcPr anchor="ctr"/>
+                </a:tc>
+                <a:tc>
+                  <a:txBody>
+                    <a:bodyPr/>
+                    <a:lstStyle/>
+                    <a:p>
+                      <a:pPr algn="ctr"/>
+                      <a:r>
+                        <a:rPr lang="fr-FR" sz="1100" dirty="0" smtClean="0"/>
+                        <a:t>3203</a:t>
+                      </a:r>
+                    </a:p>
+                  </a:txBody>
+                  <a:tcPr anchor="ctr"/>
+                </a:tc>
+              </a:tr>
+            </a:tbl>
+          </a:graphicData>
+        </a:graphic>
+      </p:graphicFrame>
+      <p:pic>
+        <p:nvPicPr>
+          <p:cNvPr id="2051" name="Picture 3"/>
+          <p:cNvPicPr>
+            <a:picLocks noChangeAspect="1" noChangeArrowheads="1"/>
+          </p:cNvPicPr>
+          <p:nvPr/>
+        </p:nvPicPr>
+        <p:blipFill>
+          <a:blip r:embed="rId3">
+            <a:extLst>
+              <a:ext uri="{28A0092B-C50C-407E-A947-70E740481C1C}">
+                <a14:useLocalDpi xmlns:a14="http://schemas.microsoft.com/office/drawing/2010/main" val="0"/>
+              </a:ext>
+            </a:extLst>
+          </a:blip>
+          <a:srcRect/>
+          <a:stretch>
+            <a:fillRect/>
+          </a:stretch>
+        </p:blipFill>
+        <p:spPr bwMode="auto">
+          <a:xfrm>
+            <a:off x="6444208" y="2211710"/>
+            <a:ext cx="2543014" cy="2520000"/>
+          </a:xfrm>
+          <a:prstGeom prst="rect">
+            <a:avLst/>
+          </a:prstGeom>
+          <a:noFill/>
+          <a:ln>
+            <a:noFill/>
+          </a:ln>
+          <a:extLst>
+            <a:ext uri="{909E8E84-426E-40DD-AFC4-6F175D3DCCD1}">
+              <a14:hiddenFill xmlns:a14="http://schemas.microsoft.com/office/drawing/2010/main">
+                <a:solidFill>
+                  <a:schemeClr val="accent1"/>
+                </a:solidFill>
+              </a14:hiddenFill>
+            </a:ext>
+            <a:ext uri="{91240B29-F687-4F45-9708-019B960494DF}">
+              <a14:hiddenLine xmlns:a14="http://schemas.microsoft.com/office/drawing/2010/main" w="9525">
+                <a:solidFill>
+                  <a:schemeClr val="tx1"/>
+                </a:solidFill>
+                <a:miter lim="800000"/>
+                <a:headEnd/>
+                <a:tailEnd/>
+              </a14:hiddenLine>
+            </a:ext>
+          </a:extLst>
+        </p:spPr>
+      </p:pic>
+    </p:spTree>
+    <p:extLst>
+      <p:ext uri="{BB962C8B-B14F-4D97-AF65-F5344CB8AC3E}">
+        <p14:creationId xmlns:p14="http://schemas.microsoft.com/office/powerpoint/2010/main" val="4260966104"/>
+      </p:ext>
+    </p:extLst>
+  </p:cSld>
+  <p:clrMapOvr>
+    <a:masterClrMapping/>
+  </p:clrMapOvr>
+</p:sld>
+</file>
+
+<file path=ppt/slides/slide12.xml><?xml version="1.0" encoding="utf-8"?>
+<p:sld xmlns:a="http://schemas.openxmlformats.org/drawingml/2006/main" xmlns:r="http://schemas.openxmlformats.org/officeDocument/2006/relationships" xmlns:p="http://schemas.openxmlformats.org/presentationml/2006/main">
+  <p:cSld>
+    <p:spTree>
+      <p:nvGrpSpPr>
+        <p:cNvPr id="1" name=""/>
+        <p:cNvGrpSpPr/>
+        <p:nvPr/>
+      </p:nvGrpSpPr>
+      <p:grpSpPr>
+        <a:xfrm>
+          <a:off x="0" y="0"/>
+          <a:ext cx="0" cy="0"/>
+          <a:chOff x="0" y="0"/>
+          <a:chExt cx="0" cy="0"/>
+        </a:xfrm>
+      </p:grpSpPr>
+      <p:sp>
+        <p:nvSpPr>
+          <p:cNvPr id="2" name="Title 1"/>
+          <p:cNvSpPr>
+            <a:spLocks noGrp="1"/>
+          </p:cNvSpPr>
+          <p:nvPr>
+            <p:ph type="title"/>
+          </p:nvPr>
+        </p:nvSpPr>
+        <p:spPr/>
+        <p:txBody>
+          <a:bodyPr/>
+          <a:lstStyle/>
+          <a:p>
+            <a:r>
+              <a:rPr lang="fr-FR" dirty="0"/>
+              <a:t>Modélisation – Forêts </a:t>
+            </a:r>
+            <a:r>
+              <a:rPr lang="fr-FR" dirty="0" smtClean="0"/>
+              <a:t>Aléatoires</a:t>
+            </a:r>
+            <a:endParaRPr lang="en-US" dirty="0"/>
+          </a:p>
+        </p:txBody>
+      </p:sp>
+      <p:sp>
+        <p:nvSpPr>
+          <p:cNvPr id="3" name="Content Placeholder 2"/>
+          <p:cNvSpPr>
+            <a:spLocks noGrp="1"/>
+          </p:cNvSpPr>
+          <p:nvPr>
+            <p:ph idx="1"/>
+          </p:nvPr>
+        </p:nvSpPr>
+        <p:spPr/>
+        <p:txBody>
+          <a:bodyPr/>
+          <a:lstStyle/>
+          <a:p>
+            <a:r>
+              <a:rPr lang="fr-FR" dirty="0"/>
+              <a:t>I</a:t>
+            </a:r>
+            <a:r>
+              <a:rPr lang="fr-FR" dirty="0" smtClean="0"/>
+              <a:t>mportance relative des variables explicatives</a:t>
+            </a:r>
+            <a:endParaRPr lang="en-US" dirty="0"/>
+          </a:p>
+        </p:txBody>
+      </p:sp>
+      <p:pic>
+        <p:nvPicPr>
+          <p:cNvPr id="3074" name="Picture 2"/>
+          <p:cNvPicPr>
+            <a:picLocks noChangeAspect="1" noChangeArrowheads="1"/>
+          </p:cNvPicPr>
+          <p:nvPr/>
+        </p:nvPicPr>
+        <p:blipFill>
+          <a:blip r:embed="rId2">
+            <a:extLst>
+              <a:ext uri="{28A0092B-C50C-407E-A947-70E740481C1C}">
+                <a14:useLocalDpi xmlns:a14="http://schemas.microsoft.com/office/drawing/2010/main" val="0"/>
+              </a:ext>
+            </a:extLst>
+          </a:blip>
+          <a:srcRect/>
+          <a:stretch>
+            <a:fillRect/>
+          </a:stretch>
+        </p:blipFill>
+        <p:spPr bwMode="auto">
+          <a:xfrm>
+            <a:off x="971600" y="1923678"/>
+            <a:ext cx="7200000" cy="2630192"/>
+          </a:xfrm>
+          <a:prstGeom prst="rect">
+            <a:avLst/>
+          </a:prstGeom>
+          <a:noFill/>
+          <a:ln>
+            <a:noFill/>
+          </a:ln>
+          <a:extLst>
+            <a:ext uri="{909E8E84-426E-40DD-AFC4-6F175D3DCCD1}">
+              <a14:hiddenFill xmlns:a14="http://schemas.microsoft.com/office/drawing/2010/main">
+                <a:solidFill>
+                  <a:schemeClr val="accent1"/>
+                </a:solidFill>
+              </a14:hiddenFill>
+            </a:ext>
+            <a:ext uri="{91240B29-F687-4F45-9708-019B960494DF}">
+              <a14:hiddenLine xmlns:a14="http://schemas.microsoft.com/office/drawing/2010/main" w="9525">
+                <a:solidFill>
+                  <a:schemeClr val="tx1"/>
+                </a:solidFill>
+                <a:miter lim="800000"/>
+                <a:headEnd/>
+                <a:tailEnd/>
+              </a14:hiddenLine>
+            </a:ext>
+          </a:extLst>
+        </p:spPr>
+      </p:pic>
+    </p:spTree>
+    <p:extLst>
+      <p:ext uri="{BB962C8B-B14F-4D97-AF65-F5344CB8AC3E}">
+        <p14:creationId xmlns:p14="http://schemas.microsoft.com/office/powerpoint/2010/main" val="1074155223"/>
+      </p:ext>
+    </p:extLst>
+  </p:cSld>
+  <p:clrMapOvr>
+    <a:masterClrMapping/>
+  </p:clrMapOvr>
+</p:sld>
+</file>
+
+<file path=ppt/slides/slide13.xml><?xml version="1.0" encoding="utf-8"?>
+<p:sld xmlns:a="http://schemas.openxmlformats.org/drawingml/2006/main" xmlns:r="http://schemas.openxmlformats.org/officeDocument/2006/relationships" xmlns:p="http://schemas.openxmlformats.org/presentationml/2006/main">
+  <p:cSld>
+    <p:spTree>
+      <p:nvGrpSpPr>
+        <p:cNvPr id="1" name=""/>
+        <p:cNvGrpSpPr/>
+        <p:nvPr/>
+      </p:nvGrpSpPr>
+      <p:grpSpPr>
+        <a:xfrm>
+          <a:off x="0" y="0"/>
+          <a:ext cx="0" cy="0"/>
+          <a:chOff x="0" y="0"/>
+          <a:chExt cx="0" cy="0"/>
+        </a:xfrm>
+      </p:grpSpPr>
+      <p:sp>
+        <p:nvSpPr>
+          <p:cNvPr id="2" name="Title 1"/>
+          <p:cNvSpPr>
+            <a:spLocks noGrp="1"/>
+          </p:cNvSpPr>
+          <p:nvPr>
+            <p:ph type="title"/>
+          </p:nvPr>
+        </p:nvSpPr>
+        <p:spPr/>
+        <p:txBody>
+          <a:bodyPr>
+            <a:normAutofit fontScale="90000"/>
+          </a:bodyPr>
+          <a:lstStyle/>
+          <a:p>
+            <a:r>
+              <a:rPr lang="fr-FR" dirty="0"/>
+              <a:t>Modélisation – </a:t>
+            </a:r>
+            <a:r>
+              <a:rPr lang="fr-FR" dirty="0" smtClean="0"/>
+              <a:t>Régressions Pénalisées</a:t>
+            </a:r>
+            <a:endParaRPr lang="en-US" dirty="0"/>
+          </a:p>
+        </p:txBody>
+      </p:sp>
+      <p:sp>
+        <p:nvSpPr>
+          <p:cNvPr id="3" name="Content Placeholder 2"/>
+          <p:cNvSpPr>
+            <a:spLocks noGrp="1"/>
+          </p:cNvSpPr>
+          <p:nvPr>
+            <p:ph idx="1"/>
+          </p:nvPr>
+        </p:nvSpPr>
+        <p:spPr/>
+        <p:txBody>
+          <a:bodyPr/>
+          <a:lstStyle/>
+          <a:p>
+            <a:endParaRPr lang="en-US"/>
+          </a:p>
+        </p:txBody>
+      </p:sp>
+    </p:spTree>
+    <p:extLst>
+      <p:ext uri="{BB962C8B-B14F-4D97-AF65-F5344CB8AC3E}">
+        <p14:creationId xmlns:p14="http://schemas.microsoft.com/office/powerpoint/2010/main" val="1681387434"/>
+      </p:ext>
+    </p:extLst>
+  </p:cSld>
+  <p:clrMapOvr>
+    <a:masterClrMapping/>
+  </p:clrMapOvr>
+</p:sld>
+</file>
+
+<file path=ppt/slides/slide14.xml><?xml version="1.0" encoding="utf-8"?>
+<p:sld xmlns:a="http://schemas.openxmlformats.org/drawingml/2006/main" xmlns:r="http://schemas.openxmlformats.org/officeDocument/2006/relationships" xmlns:p="http://schemas.openxmlformats.org/presentationml/2006/main">
+  <p:cSld>
+    <p:spTree>
+      <p:nvGrpSpPr>
+        <p:cNvPr id="1" name=""/>
+        <p:cNvGrpSpPr/>
+        <p:nvPr/>
+      </p:nvGrpSpPr>
+      <p:grpSpPr>
+        <a:xfrm>
+          <a:off x="0" y="0"/>
+          <a:ext cx="0" cy="0"/>
+          <a:chOff x="0" y="0"/>
+          <a:chExt cx="0" cy="0"/>
+        </a:xfrm>
+      </p:grpSpPr>
+      <p:sp>
+        <p:nvSpPr>
+          <p:cNvPr id="2" name="Title 1"/>
+          <p:cNvSpPr>
+            <a:spLocks noGrp="1"/>
+          </p:cNvSpPr>
+          <p:nvPr>
+            <p:ph type="title"/>
+          </p:nvPr>
+        </p:nvSpPr>
+        <p:spPr/>
+        <p:txBody>
+          <a:bodyPr/>
+          <a:lstStyle/>
+          <a:p>
+            <a:r>
+              <a:rPr lang="fr-FR" dirty="0" smtClean="0"/>
+              <a:t>Modélisation - SVM </a:t>
+            </a:r>
+            <a:endParaRPr lang="en-US" dirty="0"/>
+          </a:p>
+        </p:txBody>
+      </p:sp>
+      <p:sp>
+        <p:nvSpPr>
+          <p:cNvPr id="3" name="Content Placeholder 2"/>
+          <p:cNvSpPr>
+            <a:spLocks noGrp="1"/>
+          </p:cNvSpPr>
+          <p:nvPr>
+            <p:ph idx="1"/>
+          </p:nvPr>
+        </p:nvSpPr>
+        <p:spPr/>
+        <p:txBody>
+          <a:bodyPr/>
+          <a:lstStyle/>
+          <a:p>
+            <a:endParaRPr lang="en-US"/>
+          </a:p>
+        </p:txBody>
+      </p:sp>
+    </p:spTree>
+    <p:extLst>
+      <p:ext uri="{BB962C8B-B14F-4D97-AF65-F5344CB8AC3E}">
+        <p14:creationId xmlns:p14="http://schemas.microsoft.com/office/powerpoint/2010/main" val="2311047668"/>
+      </p:ext>
+    </p:extLst>
+  </p:cSld>
+  <p:clrMapOvr>
+    <a:masterClrMapping/>
+  </p:clrMapOvr>
+</p:sld>
+</file>
+
+<file path=ppt/slides/slide15.xml><?xml version="1.0" encoding="utf-8"?>
+<p:sld xmlns:a="http://schemas.openxmlformats.org/drawingml/2006/main" xmlns:r="http://schemas.openxmlformats.org/officeDocument/2006/relationships" xmlns:p="http://schemas.openxmlformats.org/presentationml/2006/main">
+  <p:cSld>
+    <p:spTree>
+      <p:nvGrpSpPr>
+        <p:cNvPr id="1" name=""/>
+        <p:cNvGrpSpPr/>
+        <p:nvPr/>
+      </p:nvGrpSpPr>
+      <p:grpSpPr>
+        <a:xfrm>
+          <a:off x="0" y="0"/>
+          <a:ext cx="0" cy="0"/>
+          <a:chOff x="0" y="0"/>
+          <a:chExt cx="0" cy="0"/>
+        </a:xfrm>
+      </p:grpSpPr>
+      <p:sp>
+        <p:nvSpPr>
+          <p:cNvPr id="2" name="Title 1"/>
+          <p:cNvSpPr>
+            <a:spLocks noGrp="1"/>
+          </p:cNvSpPr>
+          <p:nvPr>
+            <p:ph type="title"/>
+          </p:nvPr>
+        </p:nvSpPr>
+        <p:spPr/>
+        <p:txBody>
+          <a:bodyPr>
+            <a:normAutofit fontScale="90000"/>
+          </a:bodyPr>
+          <a:lstStyle/>
+          <a:p>
+            <a:r>
+              <a:rPr lang="fr-FR" dirty="0" smtClean="0"/>
+              <a:t>Modélisation – </a:t>
+            </a:r>
+            <a:r>
+              <a:rPr lang="fr-FR" i="1" dirty="0" smtClean="0"/>
+              <a:t>Gradient </a:t>
+            </a:r>
+            <a:r>
+              <a:rPr lang="fr-FR" i="1" dirty="0" err="1" smtClean="0"/>
+              <a:t>Boosted</a:t>
+            </a:r>
+            <a:r>
+              <a:rPr lang="fr-FR" i="1" dirty="0" smtClean="0"/>
+              <a:t> </a:t>
+            </a:r>
+            <a:r>
+              <a:rPr lang="fr-FR" i="1" dirty="0" err="1" smtClean="0"/>
+              <a:t>Trees</a:t>
+            </a:r>
+            <a:endParaRPr lang="en-US" i="1" dirty="0"/>
+          </a:p>
+        </p:txBody>
+      </p:sp>
+      <p:sp>
+        <p:nvSpPr>
+          <p:cNvPr id="3" name="Content Placeholder 2"/>
+          <p:cNvSpPr>
+            <a:spLocks noGrp="1"/>
+          </p:cNvSpPr>
+          <p:nvPr>
+            <p:ph idx="1"/>
+          </p:nvPr>
+        </p:nvSpPr>
+        <p:spPr/>
+        <p:txBody>
+          <a:bodyPr/>
+          <a:lstStyle/>
+          <a:p>
+            <a:endParaRPr lang="en-US"/>
+          </a:p>
+        </p:txBody>
+      </p:sp>
+    </p:spTree>
+    <p:extLst>
+      <p:ext uri="{BB962C8B-B14F-4D97-AF65-F5344CB8AC3E}">
+        <p14:creationId xmlns:p14="http://schemas.microsoft.com/office/powerpoint/2010/main" val="1417676413"/>
+      </p:ext>
+    </p:extLst>
+  </p:cSld>
+  <p:clrMapOvr>
+    <a:masterClrMapping/>
+  </p:clrMapOvr>
+</p:sld>
+</file>
+
+<file path=ppt/slides/slide16.xml><?xml version="1.0" encoding="utf-8"?>
+<p:sld xmlns:a="http://schemas.openxmlformats.org/drawingml/2006/main" xmlns:r="http://schemas.openxmlformats.org/officeDocument/2006/relationships" xmlns:p="http://schemas.openxmlformats.org/presentationml/2006/main">
+  <p:cSld>
+    <p:spTree>
+      <p:nvGrpSpPr>
+        <p:cNvPr id="1" name=""/>
+        <p:cNvGrpSpPr/>
+        <p:nvPr/>
+      </p:nvGrpSpPr>
+      <p:grpSpPr>
+        <a:xfrm>
+          <a:off x="0" y="0"/>
+          <a:ext cx="0" cy="0"/>
+          <a:chOff x="0" y="0"/>
+          <a:chExt cx="0" cy="0"/>
+        </a:xfrm>
+      </p:grpSpPr>
+      <p:sp>
+        <p:nvSpPr>
+          <p:cNvPr id="2" name="Title 1"/>
+          <p:cNvSpPr>
+            <a:spLocks noGrp="1"/>
+          </p:cNvSpPr>
+          <p:nvPr>
+            <p:ph type="title"/>
+          </p:nvPr>
+        </p:nvSpPr>
+        <p:spPr/>
+        <p:txBody>
+          <a:bodyPr/>
+          <a:lstStyle/>
+          <a:p>
+            <a:r>
+              <a:rPr lang="fr-FR" dirty="0" smtClean="0"/>
+              <a:t>Stations étudiées</a:t>
+            </a:r>
+            <a:endParaRPr lang="en-US" dirty="0"/>
+          </a:p>
+        </p:txBody>
+      </p:sp>
+      <p:graphicFrame>
+        <p:nvGraphicFramePr>
+          <p:cNvPr id="6" name="Object 5"/>
+          <p:cNvGraphicFramePr>
+            <a:graphicFrameLocks noChangeAspect="1"/>
+          </p:cNvGraphicFramePr>
+          <p:nvPr>
+            <p:extLst>
+              <p:ext uri="{D42A27DB-BD31-4B8C-83A1-F6EECF244321}">
+                <p14:modId xmlns:p14="http://schemas.microsoft.com/office/powerpoint/2010/main" val="1483928682"/>
+              </p:ext>
+            </p:extLst>
+          </p:nvPr>
+        </p:nvGraphicFramePr>
+        <p:xfrm>
+          <a:off x="539552" y="1851670"/>
+          <a:ext cx="2447925" cy="1152525"/>
+        </p:xfrm>
+        <a:graphic>
+          <a:graphicData uri="http://schemas.openxmlformats.org/presentationml/2006/ole">
+            <mc:AlternateContent xmlns:mc="http://schemas.openxmlformats.org/markup-compatibility/2006">
+              <mc:Choice xmlns:v="urn:schemas-microsoft-com:vml" Requires="v">
+                <p:oleObj spid="_x0000_s1138" name="Worksheet" r:id="rId3" imgW="2447851" imgH="1152630" progId="Excel.Sheet.12">
+                  <p:embed/>
+                </p:oleObj>
+              </mc:Choice>
+              <mc:Fallback>
+                <p:oleObj name="Worksheet" r:id="rId3" imgW="2447851" imgH="1152630" progId="Excel.Sheet.12">
+                  <p:embed/>
+                  <p:pic>
+                    <p:nvPicPr>
+                      <p:cNvPr id="0" name=""/>
+                      <p:cNvPicPr/>
+                      <p:nvPr/>
+                    </p:nvPicPr>
+                    <p:blipFill>
+                      <a:blip r:embed="rId4"/>
+                      <a:stretch>
+                        <a:fillRect/>
+                      </a:stretch>
+                    </p:blipFill>
+                    <p:spPr>
+                      <a:xfrm>
+                        <a:off x="539552" y="1851670"/>
+                        <a:ext cx="2447925" cy="1152525"/>
+                      </a:xfrm>
+                      <a:prstGeom prst="rect">
+                        <a:avLst/>
+                      </a:prstGeom>
+                    </p:spPr>
+                  </p:pic>
+                </p:oleObj>
+              </mc:Fallback>
+            </mc:AlternateContent>
+          </a:graphicData>
+        </a:graphic>
+      </p:graphicFrame>
+      <p:graphicFrame>
+        <p:nvGraphicFramePr>
+          <p:cNvPr id="7" name="Object 6"/>
+          <p:cNvGraphicFramePr>
+            <a:graphicFrameLocks noChangeAspect="1"/>
+          </p:cNvGraphicFramePr>
+          <p:nvPr>
+            <p:extLst>
+              <p:ext uri="{D42A27DB-BD31-4B8C-83A1-F6EECF244321}">
+                <p14:modId xmlns:p14="http://schemas.microsoft.com/office/powerpoint/2010/main" val="3900466050"/>
+              </p:ext>
+            </p:extLst>
+          </p:nvPr>
+        </p:nvGraphicFramePr>
+        <p:xfrm>
+          <a:off x="3348038" y="2376488"/>
+          <a:ext cx="2447925" cy="390525"/>
+        </p:xfrm>
+        <a:graphic>
+          <a:graphicData uri="http://schemas.openxmlformats.org/presentationml/2006/ole">
+            <mc:AlternateContent xmlns:mc="http://schemas.openxmlformats.org/markup-compatibility/2006">
+              <mc:Choice xmlns:v="urn:schemas-microsoft-com:vml" Requires="v">
+                <p:oleObj spid="_x0000_s1139" name="Worksheet" r:id="rId5" imgW="2447851" imgH="390420" progId="Excel.Sheet.12">
+                  <p:embed/>
+                </p:oleObj>
+              </mc:Choice>
+              <mc:Fallback>
+                <p:oleObj name="Worksheet" r:id="rId5" imgW="2447851" imgH="390420" progId="Excel.Sheet.12">
+                  <p:embed/>
+                  <p:pic>
+                    <p:nvPicPr>
+                      <p:cNvPr id="0" name=""/>
+                      <p:cNvPicPr/>
+                      <p:nvPr/>
+                    </p:nvPicPr>
+                    <p:blipFill>
+                      <a:blip r:embed="rId6"/>
+                      <a:stretch>
+                        <a:fillRect/>
+                      </a:stretch>
+                    </p:blipFill>
+                    <p:spPr>
+                      <a:xfrm>
+                        <a:off x="3348038" y="2376488"/>
+                        <a:ext cx="2447925" cy="390525"/>
+                      </a:xfrm>
+                      <a:prstGeom prst="rect">
+                        <a:avLst/>
+                      </a:prstGeom>
+                    </p:spPr>
+                  </p:pic>
+                </p:oleObj>
+              </mc:Fallback>
+            </mc:AlternateContent>
+          </a:graphicData>
+        </a:graphic>
+      </p:graphicFrame>
+      <p:graphicFrame>
+        <p:nvGraphicFramePr>
+          <p:cNvPr id="8" name="Object 7"/>
+          <p:cNvGraphicFramePr>
+            <a:graphicFrameLocks noChangeAspect="1"/>
+          </p:cNvGraphicFramePr>
+          <p:nvPr>
+            <p:extLst>
+              <p:ext uri="{D42A27DB-BD31-4B8C-83A1-F6EECF244321}">
+                <p14:modId xmlns:p14="http://schemas.microsoft.com/office/powerpoint/2010/main" val="3024608846"/>
+              </p:ext>
+            </p:extLst>
+          </p:nvPr>
+        </p:nvGraphicFramePr>
+        <p:xfrm>
+          <a:off x="6084168" y="2355726"/>
+          <a:ext cx="2447925" cy="390525"/>
+        </p:xfrm>
+        <a:graphic>
+          <a:graphicData uri="http://schemas.openxmlformats.org/presentationml/2006/ole">
+            <mc:AlternateContent xmlns:mc="http://schemas.openxmlformats.org/markup-compatibility/2006">
+              <mc:Choice xmlns:v="urn:schemas-microsoft-com:vml" Requires="v">
+                <p:oleObj spid="_x0000_s1140" name="Worksheet" r:id="rId7" imgW="2447851" imgH="390420" progId="Excel.Sheet.12">
+                  <p:embed/>
+                </p:oleObj>
+              </mc:Choice>
+              <mc:Fallback>
+                <p:oleObj name="Worksheet" r:id="rId7" imgW="2447851" imgH="390420" progId="Excel.Sheet.12">
+                  <p:embed/>
+                  <p:pic>
+                    <p:nvPicPr>
+                      <p:cNvPr id="0" name=""/>
+                      <p:cNvPicPr/>
+                      <p:nvPr/>
+                    </p:nvPicPr>
+                    <p:blipFill>
+                      <a:blip r:embed="rId8"/>
+                      <a:stretch>
+                        <a:fillRect/>
+                      </a:stretch>
+                    </p:blipFill>
+                    <p:spPr>
+                      <a:xfrm>
+                        <a:off x="6084168" y="2355726"/>
+                        <a:ext cx="2447925" cy="390525"/>
+                      </a:xfrm>
+                      <a:prstGeom prst="rect">
+                        <a:avLst/>
+                      </a:prstGeom>
+                    </p:spPr>
+                  </p:pic>
+                </p:oleObj>
+              </mc:Fallback>
+            </mc:AlternateContent>
+          </a:graphicData>
+        </a:graphic>
+      </p:graphicFrame>
+      <p:sp>
+        <p:nvSpPr>
+          <p:cNvPr id="9" name="TextBox 8"/>
+          <p:cNvSpPr txBox="1"/>
+          <p:nvPr/>
+        </p:nvSpPr>
+        <p:spPr>
+          <a:xfrm>
+            <a:off x="519673" y="1059582"/>
+            <a:ext cx="1618264" cy="369332"/>
+          </a:xfrm>
+          <a:prstGeom prst="rect">
+            <a:avLst/>
+          </a:prstGeom>
+          <a:noFill/>
+        </p:spPr>
+        <p:txBody>
+          <a:bodyPr wrap="none" rtlCol="0">
+            <a:spAutoFit/>
+          </a:bodyPr>
+          <a:lstStyle/>
+          <a:p>
+            <a:r>
+              <a:rPr lang="fr-FR" dirty="0" smtClean="0"/>
+              <a:t>À proximité de:</a:t>
+            </a:r>
+            <a:endParaRPr lang="en-US" dirty="0"/>
+          </a:p>
+        </p:txBody>
+      </p:sp>
+      <p:sp>
+        <p:nvSpPr>
+          <p:cNvPr id="10" name="TextBox 9"/>
+          <p:cNvSpPr txBox="1"/>
+          <p:nvPr/>
+        </p:nvSpPr>
+        <p:spPr>
+          <a:xfrm>
+            <a:off x="827584" y="1441282"/>
+            <a:ext cx="1865704" cy="369332"/>
+          </a:xfrm>
+          <a:prstGeom prst="rect">
+            <a:avLst/>
+          </a:prstGeom>
+          <a:noFill/>
+        </p:spPr>
+        <p:txBody>
+          <a:bodyPr wrap="none" rtlCol="0">
+            <a:spAutoFit/>
+          </a:bodyPr>
+          <a:lstStyle/>
+          <a:p>
+            <a:r>
+              <a:rPr lang="fr-FR" dirty="0" smtClean="0"/>
+              <a:t>8, bd Saint Michel</a:t>
+            </a:r>
+            <a:endParaRPr lang="en-US" dirty="0"/>
+          </a:p>
+        </p:txBody>
+      </p:sp>
+      <p:sp>
+        <p:nvSpPr>
+          <p:cNvPr id="11" name="TextBox 10"/>
+          <p:cNvSpPr txBox="1"/>
+          <p:nvPr/>
+        </p:nvSpPr>
+        <p:spPr>
+          <a:xfrm>
+            <a:off x="3563888" y="1441282"/>
+            <a:ext cx="2021131" cy="369332"/>
+          </a:xfrm>
+          <a:prstGeom prst="rect">
+            <a:avLst/>
+          </a:prstGeom>
+          <a:noFill/>
+        </p:spPr>
+        <p:txBody>
+          <a:bodyPr wrap="none" rtlCol="0">
+            <a:spAutoFit/>
+          </a:bodyPr>
+          <a:lstStyle/>
+          <a:p>
+            <a:r>
+              <a:rPr lang="fr-FR" dirty="0" smtClean="0"/>
+              <a:t>88, rue de la </a:t>
+            </a:r>
+            <a:r>
+              <a:rPr lang="fr-FR" dirty="0" err="1" smtClean="0"/>
+              <a:t>Vilette</a:t>
+            </a:r>
+            <a:endParaRPr lang="en-US" dirty="0"/>
+          </a:p>
+        </p:txBody>
+      </p:sp>
+      <p:sp>
+        <p:nvSpPr>
+          <p:cNvPr id="12" name="TextBox 11"/>
+          <p:cNvSpPr txBox="1"/>
+          <p:nvPr/>
+        </p:nvSpPr>
+        <p:spPr>
+          <a:xfrm>
+            <a:off x="6310600" y="1410330"/>
+            <a:ext cx="1357744" cy="369332"/>
+          </a:xfrm>
+          <a:prstGeom prst="rect">
+            <a:avLst/>
+          </a:prstGeom>
+          <a:noFill/>
+        </p:spPr>
+        <p:txBody>
+          <a:bodyPr wrap="none" rtlCol="0">
+            <a:spAutoFit/>
+          </a:bodyPr>
+          <a:lstStyle/>
+          <a:p>
+            <a:r>
+              <a:rPr lang="fr-FR" dirty="0" err="1" smtClean="0"/>
+              <a:t>MontMartre</a:t>
+            </a:r>
+            <a:endParaRPr lang="en-US" dirty="0"/>
+          </a:p>
+        </p:txBody>
+      </p:sp>
+      <p:graphicFrame>
+        <p:nvGraphicFramePr>
+          <p:cNvPr id="13" name="Object 12"/>
+          <p:cNvGraphicFramePr>
+            <a:graphicFrameLocks noChangeAspect="1"/>
+          </p:cNvGraphicFramePr>
+          <p:nvPr>
+            <p:extLst>
+              <p:ext uri="{D42A27DB-BD31-4B8C-83A1-F6EECF244321}">
+                <p14:modId xmlns:p14="http://schemas.microsoft.com/office/powerpoint/2010/main" val="2074598280"/>
+              </p:ext>
+            </p:extLst>
+          </p:nvPr>
+        </p:nvGraphicFramePr>
+        <p:xfrm>
+          <a:off x="536473" y="3723878"/>
+          <a:ext cx="2447925" cy="771525"/>
+        </p:xfrm>
+        <a:graphic>
+          <a:graphicData uri="http://schemas.openxmlformats.org/presentationml/2006/ole">
+            <mc:AlternateContent xmlns:mc="http://schemas.openxmlformats.org/markup-compatibility/2006">
+              <mc:Choice xmlns:v="urn:schemas-microsoft-com:vml" Requires="v">
+                <p:oleObj spid="_x0000_s1141" name="Worksheet" r:id="rId9" imgW="2447851" imgH="771660" progId="Excel.Sheet.12">
+                  <p:embed/>
+                </p:oleObj>
+              </mc:Choice>
+              <mc:Fallback>
+                <p:oleObj name="Worksheet" r:id="rId9" imgW="2447851" imgH="771660" progId="Excel.Sheet.12">
+                  <p:embed/>
+                  <p:pic>
+                    <p:nvPicPr>
+                      <p:cNvPr id="0" name=""/>
+                      <p:cNvPicPr/>
+                      <p:nvPr/>
+                    </p:nvPicPr>
+                    <p:blipFill>
+                      <a:blip r:embed="rId10"/>
+                      <a:stretch>
+                        <a:fillRect/>
+                      </a:stretch>
+                    </p:blipFill>
+                    <p:spPr>
+                      <a:xfrm>
+                        <a:off x="536473" y="3723878"/>
+                        <a:ext cx="2447925" cy="771525"/>
+                      </a:xfrm>
+                      <a:prstGeom prst="rect">
+                        <a:avLst/>
+                      </a:prstGeom>
+                    </p:spPr>
+                  </p:pic>
+                </p:oleObj>
+              </mc:Fallback>
+            </mc:AlternateContent>
+          </a:graphicData>
+        </a:graphic>
+      </p:graphicFrame>
+      <p:sp>
+        <p:nvSpPr>
+          <p:cNvPr id="14" name="TextBox 13"/>
+          <p:cNvSpPr txBox="1"/>
+          <p:nvPr/>
+        </p:nvSpPr>
+        <p:spPr>
+          <a:xfrm>
+            <a:off x="827584" y="3291830"/>
+            <a:ext cx="1452898" cy="369332"/>
+          </a:xfrm>
+          <a:prstGeom prst="rect">
+            <a:avLst/>
+          </a:prstGeom>
+          <a:noFill/>
+        </p:spPr>
+        <p:txBody>
+          <a:bodyPr wrap="none" rtlCol="0">
+            <a:spAutoFit/>
+          </a:bodyPr>
+          <a:lstStyle/>
+          <a:p>
+            <a:r>
+              <a:rPr lang="fr-FR" dirty="0" smtClean="0"/>
+              <a:t>Gare du Nord</a:t>
+            </a:r>
+            <a:endParaRPr lang="en-US" dirty="0"/>
+          </a:p>
+        </p:txBody>
+      </p:sp>
+    </p:spTree>
+    <p:extLst>
+      <p:ext uri="{BB962C8B-B14F-4D97-AF65-F5344CB8AC3E}">
+        <p14:creationId xmlns:p14="http://schemas.microsoft.com/office/powerpoint/2010/main" val="3416802583"/>
+      </p:ext>
+    </p:extLst>
+  </p:cSld>
+  <p:clrMapOvr>
+    <a:masterClrMapping/>
+  </p:clrMapOvr>
+  <p:timing>
+    <p:tnLst>
+      <p:par>
+        <p:cTn id="1" dur="indefinite" restart="never" nodeType="tmRoot"/>
+      </p:par>
+    </p:tnLst>
+  </p:timing>
+</p:sld>
+</file>
+
+<file path=ppt/slides/slide17.xml><?xml version="1.0" encoding="utf-8"?>
+<p:sld xmlns:a="http://schemas.openxmlformats.org/drawingml/2006/main" xmlns:r="http://schemas.openxmlformats.org/officeDocument/2006/relationships" xmlns:p="http://schemas.openxmlformats.org/presentationml/2006/main">
+  <p:cSld>
+    <p:spTree>
+      <p:nvGrpSpPr>
+        <p:cNvPr id="1" name=""/>
+        <p:cNvGrpSpPr/>
+        <p:nvPr/>
+      </p:nvGrpSpPr>
+      <p:grpSpPr>
+        <a:xfrm>
+          <a:off x="0" y="0"/>
+          <a:ext cx="0" cy="0"/>
+          <a:chOff x="0" y="0"/>
+          <a:chExt cx="0" cy="0"/>
+        </a:xfrm>
+      </p:grpSpPr>
+      <p:sp>
+        <p:nvSpPr>
+          <p:cNvPr id="2" name="Title 1"/>
+          <p:cNvSpPr>
+            <a:spLocks noGrp="1"/>
+          </p:cNvSpPr>
+          <p:nvPr>
+            <p:ph type="title"/>
+          </p:nvPr>
+        </p:nvSpPr>
+        <p:spPr/>
+        <p:txBody>
+          <a:bodyPr>
+            <a:normAutofit fontScale="90000"/>
+          </a:bodyPr>
+          <a:lstStyle/>
+          <a:p>
+            <a:r>
+              <a:rPr lang="fr-FR" dirty="0" smtClean="0"/>
+              <a:t>Illustration mise en forme des données</a:t>
+            </a:r>
+            <a:endParaRPr lang="en-US" dirty="0"/>
+          </a:p>
+        </p:txBody>
+      </p:sp>
+      <p:sp>
+        <p:nvSpPr>
+          <p:cNvPr id="3" name="Content Placeholder 2"/>
+          <p:cNvSpPr>
+            <a:spLocks noGrp="1"/>
+          </p:cNvSpPr>
+          <p:nvPr>
+            <p:ph idx="1"/>
+          </p:nvPr>
+        </p:nvSpPr>
+        <p:spPr>
+          <a:xfrm>
+            <a:off x="457200" y="1200151"/>
+            <a:ext cx="2818656" cy="3394472"/>
+          </a:xfrm>
+        </p:spPr>
+        <p:txBody>
+          <a:bodyPr>
+            <a:normAutofit fontScale="85000" lnSpcReduction="10000"/>
+          </a:bodyPr>
+          <a:lstStyle/>
+          <a:p>
+            <a:r>
+              <a:rPr lang="fr-FR" dirty="0" smtClean="0"/>
+              <a:t>Pour une station</a:t>
+            </a:r>
+          </a:p>
+          <a:p>
+            <a:r>
+              <a:rPr lang="fr-FR" dirty="0" smtClean="0"/>
+              <a:t>Noir: </a:t>
+            </a:r>
+            <a:r>
+              <a:rPr lang="fr-FR" dirty="0" err="1" smtClean="0"/>
+              <a:t>available_bikes</a:t>
+            </a:r>
+            <a:endParaRPr lang="fr-FR" dirty="0" smtClean="0"/>
+          </a:p>
+          <a:p>
+            <a:r>
+              <a:rPr lang="fr-FR" dirty="0" smtClean="0"/>
+              <a:t>Rouge: </a:t>
+            </a:r>
+            <a:r>
+              <a:rPr lang="fr-FR" dirty="0" err="1" smtClean="0"/>
+              <a:t>available_bikes_minusH</a:t>
+            </a:r>
+            <a:r>
+              <a:rPr lang="fr-FR" dirty="0" smtClean="0"/>
+              <a:t> (X=3)</a:t>
+            </a:r>
+            <a:endParaRPr lang="en-US" dirty="0"/>
+          </a:p>
+        </p:txBody>
+      </p:sp>
+      <p:pic>
+        <p:nvPicPr>
+          <p:cNvPr id="4098" name="Picture 2"/>
+          <p:cNvPicPr>
+            <a:picLocks noChangeAspect="1" noChangeArrowheads="1"/>
+          </p:cNvPicPr>
+          <p:nvPr/>
+        </p:nvPicPr>
+        <p:blipFill>
+          <a:blip r:embed="rId2">
+            <a:extLst>
+              <a:ext uri="{28A0092B-C50C-407E-A947-70E740481C1C}">
+                <a14:useLocalDpi xmlns:a14="http://schemas.microsoft.com/office/drawing/2010/main" val="0"/>
+              </a:ext>
+            </a:extLst>
+          </a:blip>
+          <a:srcRect/>
+          <a:stretch>
+            <a:fillRect/>
+          </a:stretch>
+        </p:blipFill>
+        <p:spPr bwMode="auto">
+          <a:xfrm>
+            <a:off x="3491880" y="1203598"/>
+            <a:ext cx="5577170" cy="3600000"/>
+          </a:xfrm>
+          <a:prstGeom prst="rect">
+            <a:avLst/>
+          </a:prstGeom>
+          <a:noFill/>
+          <a:ln>
+            <a:noFill/>
+          </a:ln>
+          <a:extLst>
+            <a:ext uri="{909E8E84-426E-40DD-AFC4-6F175D3DCCD1}">
+              <a14:hiddenFill xmlns:a14="http://schemas.microsoft.com/office/drawing/2010/main">
+                <a:solidFill>
+                  <a:schemeClr val="accent1"/>
+                </a:solidFill>
+              </a14:hiddenFill>
+            </a:ext>
+            <a:ext uri="{91240B29-F687-4F45-9708-019B960494DF}">
+              <a14:hiddenLine xmlns:a14="http://schemas.microsoft.com/office/drawing/2010/main" w="9525">
+                <a:solidFill>
+                  <a:schemeClr val="tx1"/>
+                </a:solidFill>
+                <a:miter lim="800000"/>
+                <a:headEnd/>
+                <a:tailEnd/>
+              </a14:hiddenLine>
+            </a:ext>
+          </a:extLst>
+        </p:spPr>
+      </p:pic>
+      <p:sp>
+        <p:nvSpPr>
+          <p:cNvPr id="4" name="TextBox 3"/>
+          <p:cNvSpPr txBox="1"/>
+          <p:nvPr/>
+        </p:nvSpPr>
+        <p:spPr>
+          <a:xfrm>
+            <a:off x="107505" y="3786594"/>
+            <a:ext cx="3312368" cy="1200329"/>
+          </a:xfrm>
+          <a:prstGeom prst="rect">
+            <a:avLst/>
+          </a:prstGeom>
+          <a:noFill/>
+        </p:spPr>
+        <p:txBody>
+          <a:bodyPr wrap="square" rtlCol="0">
+            <a:spAutoFit/>
+          </a:bodyPr>
+          <a:lstStyle/>
+          <a:p>
+            <a:r>
+              <a:rPr lang="fr-FR" dirty="0" smtClean="0"/>
+              <a:t>(affichage en fonction du numéro du jour dans le mois, c’est pourquoi il peut y avoir plusieurs valeurs pour la même heure)</a:t>
+            </a:r>
+            <a:endParaRPr lang="en-US" dirty="0"/>
+          </a:p>
+        </p:txBody>
+      </p:sp>
+      <p:cxnSp>
+        <p:nvCxnSpPr>
+          <p:cNvPr id="6" name="Straight Arrow Connector 5"/>
+          <p:cNvCxnSpPr/>
+          <p:nvPr/>
+        </p:nvCxnSpPr>
+        <p:spPr>
+          <a:xfrm>
+            <a:off x="5940152" y="3291830"/>
+            <a:ext cx="379766" cy="0"/>
+          </a:xfrm>
+          <a:prstGeom prst="straightConnector1">
+            <a:avLst/>
+          </a:prstGeom>
+          <a:ln w="57150">
+            <a:solidFill>
+              <a:srgbClr val="FF0000"/>
+            </a:solidFill>
+            <a:tailEnd type="arrow"/>
+          </a:ln>
+        </p:spPr>
+        <p:style>
+          <a:lnRef idx="1">
+            <a:schemeClr val="accent1"/>
+          </a:lnRef>
+          <a:fillRef idx="0">
+            <a:schemeClr val="accent1"/>
+          </a:fillRef>
+          <a:effectRef idx="0">
+            <a:schemeClr val="accent1"/>
+          </a:effectRef>
+          <a:fontRef idx="minor">
+            <a:schemeClr val="tx1"/>
+          </a:fontRef>
+        </p:style>
+      </p:cxnSp>
+    </p:spTree>
+    <p:extLst>
+      <p:ext uri="{BB962C8B-B14F-4D97-AF65-F5344CB8AC3E}">
+        <p14:creationId xmlns:p14="http://schemas.microsoft.com/office/powerpoint/2010/main" val="57559147"/>
+      </p:ext>
+    </p:extLst>
+  </p:cSld>
+  <p:clrMapOvr>
+    <a:masterClrMapping/>
+  </p:clrMapOvr>
+</p:sld>
+</file>
+
+<file path=ppt/slides/slide18.xml><?xml version="1.0" encoding="utf-8"?>
+<p:sld xmlns:a="http://schemas.openxmlformats.org/drawingml/2006/main" xmlns:r="http://schemas.openxmlformats.org/officeDocument/2006/relationships" xmlns:p="http://schemas.openxmlformats.org/presentationml/2006/main">
+  <p:cSld>
+    <p:spTree>
+      <p:nvGrpSpPr>
+        <p:cNvPr id="1" name=""/>
+        <p:cNvGrpSpPr/>
+        <p:nvPr/>
+      </p:nvGrpSpPr>
+      <p:grpSpPr>
+        <a:xfrm>
+          <a:off x="0" y="0"/>
+          <a:ext cx="0" cy="0"/>
+          <a:chOff x="0" y="0"/>
+          <a:chExt cx="0" cy="0"/>
+        </a:xfrm>
+      </p:grpSpPr>
+      <p:sp>
+        <p:nvSpPr>
+          <p:cNvPr id="2" name="Title 1"/>
+          <p:cNvSpPr>
+            <a:spLocks noGrp="1"/>
+          </p:cNvSpPr>
+          <p:nvPr>
+            <p:ph type="title"/>
+          </p:nvPr>
+        </p:nvSpPr>
+        <p:spPr/>
+        <p:txBody>
+          <a:bodyPr>
+            <a:normAutofit fontScale="90000"/>
+          </a:bodyPr>
+          <a:lstStyle/>
+          <a:p>
+            <a:r>
+              <a:rPr lang="fr-FR" dirty="0" smtClean="0"/>
+              <a:t>Illustration mise en forme des données</a:t>
+            </a:r>
+            <a:endParaRPr lang="en-US" dirty="0"/>
+          </a:p>
+        </p:txBody>
+      </p:sp>
+      <p:sp>
+        <p:nvSpPr>
+          <p:cNvPr id="3" name="Content Placeholder 2"/>
+          <p:cNvSpPr>
+            <a:spLocks noGrp="1"/>
+          </p:cNvSpPr>
+          <p:nvPr>
+            <p:ph idx="1"/>
+          </p:nvPr>
+        </p:nvSpPr>
+        <p:spPr>
+          <a:xfrm>
+            <a:off x="107504" y="1200151"/>
+            <a:ext cx="3456384" cy="3394472"/>
+          </a:xfrm>
+        </p:spPr>
+        <p:txBody>
+          <a:bodyPr>
+            <a:normAutofit/>
+          </a:bodyPr>
+          <a:lstStyle/>
+          <a:p>
+            <a:r>
+              <a:rPr lang="fr-FR" sz="2400" dirty="0" smtClean="0"/>
+              <a:t>Pour une station</a:t>
+            </a:r>
+          </a:p>
+          <a:p>
+            <a:r>
+              <a:rPr lang="fr-FR" sz="2400" dirty="0" smtClean="0"/>
+              <a:t>Noir: </a:t>
+            </a:r>
+            <a:r>
+              <a:rPr lang="fr-FR" sz="2400" dirty="0" err="1" smtClean="0"/>
+              <a:t>available_bikes</a:t>
+            </a:r>
+            <a:endParaRPr lang="fr-FR" sz="2400" dirty="0" smtClean="0"/>
+          </a:p>
+          <a:p>
+            <a:r>
+              <a:rPr lang="fr-FR" sz="2400" dirty="0" smtClean="0"/>
+              <a:t>Rouge: </a:t>
+            </a:r>
+            <a:r>
+              <a:rPr lang="fr-FR" sz="2400" dirty="0" err="1" smtClean="0"/>
+              <a:t>available_bikes_minusW</a:t>
+            </a:r>
+            <a:endParaRPr lang="en-US" sz="2400" dirty="0"/>
+          </a:p>
+        </p:txBody>
+      </p:sp>
+      <p:pic>
+        <p:nvPicPr>
+          <p:cNvPr id="5122" name="Picture 2"/>
+          <p:cNvPicPr>
+            <a:picLocks noChangeAspect="1" noChangeArrowheads="1"/>
+          </p:cNvPicPr>
+          <p:nvPr/>
+        </p:nvPicPr>
+        <p:blipFill>
+          <a:blip r:embed="rId2">
+            <a:extLst>
+              <a:ext uri="{28A0092B-C50C-407E-A947-70E740481C1C}">
+                <a14:useLocalDpi xmlns:a14="http://schemas.microsoft.com/office/drawing/2010/main" val="0"/>
+              </a:ext>
+            </a:extLst>
+          </a:blip>
+          <a:srcRect/>
+          <a:stretch>
+            <a:fillRect/>
+          </a:stretch>
+        </p:blipFill>
+        <p:spPr bwMode="auto">
+          <a:xfrm>
+            <a:off x="3491880" y="1140804"/>
+            <a:ext cx="5577170" cy="3600000"/>
+          </a:xfrm>
+          <a:prstGeom prst="rect">
+            <a:avLst/>
+          </a:prstGeom>
+          <a:noFill/>
+          <a:ln>
+            <a:noFill/>
+          </a:ln>
+          <a:extLst>
+            <a:ext uri="{909E8E84-426E-40DD-AFC4-6F175D3DCCD1}">
+              <a14:hiddenFill xmlns:a14="http://schemas.microsoft.com/office/drawing/2010/main">
+                <a:solidFill>
+                  <a:schemeClr val="accent1"/>
+                </a:solidFill>
+              </a14:hiddenFill>
+            </a:ext>
+            <a:ext uri="{91240B29-F687-4F45-9708-019B960494DF}">
+              <a14:hiddenLine xmlns:a14="http://schemas.microsoft.com/office/drawing/2010/main" w="9525">
+                <a:solidFill>
+                  <a:schemeClr val="tx1"/>
+                </a:solidFill>
+                <a:miter lim="800000"/>
+                <a:headEnd/>
+                <a:tailEnd/>
+              </a14:hiddenLine>
+            </a:ext>
+          </a:extLst>
+        </p:spPr>
+      </p:pic>
+      <p:cxnSp>
+        <p:nvCxnSpPr>
+          <p:cNvPr id="5" name="Straight Arrow Connector 4"/>
+          <p:cNvCxnSpPr/>
+          <p:nvPr/>
+        </p:nvCxnSpPr>
+        <p:spPr>
+          <a:xfrm flipH="1" flipV="1">
+            <a:off x="4932040" y="2643758"/>
+            <a:ext cx="1348425" cy="864096"/>
+          </a:xfrm>
+          <a:prstGeom prst="straightConnector1">
+            <a:avLst/>
+          </a:prstGeom>
+          <a:ln w="57150">
+            <a:solidFill>
+              <a:srgbClr val="FF0000"/>
+            </a:solidFill>
+            <a:tailEnd type="arrow"/>
+          </a:ln>
+        </p:spPr>
+        <p:style>
+          <a:lnRef idx="1">
+            <a:schemeClr val="accent1"/>
+          </a:lnRef>
+          <a:fillRef idx="0">
+            <a:schemeClr val="accent1"/>
+          </a:fillRef>
+          <a:effectRef idx="0">
+            <a:schemeClr val="accent1"/>
+          </a:effectRef>
+          <a:fontRef idx="minor">
+            <a:schemeClr val="tx1"/>
+          </a:fontRef>
+        </p:style>
+      </p:cxnSp>
+      <p:sp>
+        <p:nvSpPr>
+          <p:cNvPr id="8" name="TextBox 7"/>
+          <p:cNvSpPr txBox="1"/>
+          <p:nvPr/>
+        </p:nvSpPr>
+        <p:spPr>
+          <a:xfrm>
+            <a:off x="107505" y="3786594"/>
+            <a:ext cx="3312368" cy="1200329"/>
+          </a:xfrm>
+          <a:prstGeom prst="rect">
+            <a:avLst/>
+          </a:prstGeom>
+          <a:noFill/>
+        </p:spPr>
+        <p:txBody>
+          <a:bodyPr wrap="square" rtlCol="0">
+            <a:spAutoFit/>
+          </a:bodyPr>
+          <a:lstStyle/>
+          <a:p>
+            <a:r>
+              <a:rPr lang="fr-FR" dirty="0" smtClean="0"/>
+              <a:t>(affichage en fonction du numéro du jour dans le mois, c’est pourquoi il peut y avoir plusieurs valeurs pour la même heure)</a:t>
+            </a:r>
+            <a:endParaRPr lang="en-US" dirty="0"/>
+          </a:p>
+        </p:txBody>
+      </p:sp>
+    </p:spTree>
+    <p:extLst>
+      <p:ext uri="{BB962C8B-B14F-4D97-AF65-F5344CB8AC3E}">
+        <p14:creationId xmlns:p14="http://schemas.microsoft.com/office/powerpoint/2010/main" val="3945379847"/>
+      </p:ext>
+    </p:extLst>
+  </p:cSld>
+  <p:clrMapOvr>
+    <a:masterClrMapping/>
+  </p:clrMapOvr>
+</p:sld>
+</file>
+
 <file path=ppt/slides/slide2.xml><?xml version="1.0" encoding="utf-8"?>
 <p:sld xmlns:a="http://schemas.openxmlformats.org/drawingml/2006/main" xmlns:r="http://schemas.openxmlformats.org/officeDocument/2006/relationships" xmlns:p="http://schemas.openxmlformats.org/presentationml/2006/main">
   <p:cSld>
@@ -3728,7 +5708,7 @@
           <a:p>
             <a:r>
               <a:rPr lang="fr-FR" dirty="0" smtClean="0"/>
-              <a:t>Modélisation</a:t>
+              <a:t>Préparation des données</a:t>
             </a:r>
             <a:endParaRPr lang="en-US" dirty="0"/>
           </a:p>
@@ -4569,8 +6549,8 @@
           <a:lstStyle/>
           <a:p>
             <a:r>
-              <a:rPr lang="fr-FR" dirty="0" smtClean="0"/>
-              <a:t>Modélisation</a:t>
+              <a:rPr lang="fr-FR" dirty="0"/>
+              <a:t>Préparation des données</a:t>
             </a:r>
             <a:endParaRPr lang="en-US" dirty="0"/>
           </a:p>
@@ -5351,8 +7331,8 @@
           <a:lstStyle/>
           <a:p>
             <a:r>
-              <a:rPr lang="fr-FR" dirty="0" smtClean="0"/>
-              <a:t>Modélisation</a:t>
+              <a:rPr lang="fr-FR" dirty="0"/>
+              <a:t>Préparation des données</a:t>
             </a:r>
             <a:endParaRPr lang="en-US" dirty="0"/>
           </a:p>
@@ -6183,8 +8163,8 @@
           <a:lstStyle/>
           <a:p>
             <a:r>
-              <a:rPr lang="fr-FR" dirty="0" smtClean="0"/>
-              <a:t>Modélisation</a:t>
+              <a:rPr lang="fr-FR" dirty="0"/>
+              <a:t>Préparation des données</a:t>
             </a:r>
             <a:endParaRPr lang="en-US" dirty="0"/>
           </a:p>
@@ -7286,8 +9266,8 @@
           <a:lstStyle/>
           <a:p>
             <a:r>
-              <a:rPr lang="fr-FR" dirty="0" smtClean="0"/>
-              <a:t>Modélisation</a:t>
+              <a:rPr lang="fr-FR" dirty="0"/>
+              <a:t>Préparation des données</a:t>
             </a:r>
             <a:endParaRPr lang="en-US" dirty="0"/>
           </a:p>
@@ -8560,6 +10540,136 @@
           </p:style>
         </p:cxnSp>
       </p:grpSp>
+      <p:sp>
+        <p:nvSpPr>
+          <p:cNvPr id="3" name="Left Brace 2"/>
+          <p:cNvSpPr/>
+          <p:nvPr/>
+        </p:nvSpPr>
+        <p:spPr>
+          <a:xfrm rot="16200000">
+            <a:off x="2563408" y="1394596"/>
+            <a:ext cx="288032" cy="5234627"/>
+          </a:xfrm>
+          <a:prstGeom prst="leftBrace">
+            <a:avLst/>
+          </a:prstGeom>
+          <a:ln w="28575">
+            <a:solidFill>
+              <a:schemeClr val="tx1"/>
+            </a:solidFill>
+          </a:ln>
+        </p:spPr>
+        <p:style>
+          <a:lnRef idx="1">
+            <a:schemeClr val="accent1"/>
+          </a:lnRef>
+          <a:fillRef idx="0">
+            <a:schemeClr val="accent1"/>
+          </a:fillRef>
+          <a:effectRef idx="0">
+            <a:schemeClr val="accent1"/>
+          </a:effectRef>
+          <a:fontRef idx="minor">
+            <a:schemeClr val="tx1"/>
+          </a:fontRef>
+        </p:style>
+        <p:txBody>
+          <a:bodyPr rtlCol="0" anchor="ctr"/>
+          <a:lstStyle/>
+          <a:p>
+            <a:pPr algn="ctr"/>
+            <a:endParaRPr lang="en-US"/>
+          </a:p>
+        </p:txBody>
+      </p:sp>
+      <p:sp>
+        <p:nvSpPr>
+          <p:cNvPr id="8" name="TextBox 7"/>
+          <p:cNvSpPr txBox="1"/>
+          <p:nvPr/>
+        </p:nvSpPr>
+        <p:spPr>
+          <a:xfrm>
+            <a:off x="5553368" y="4299942"/>
+            <a:ext cx="3266343" cy="369332"/>
+          </a:xfrm>
+          <a:prstGeom prst="rect">
+            <a:avLst/>
+          </a:prstGeom>
+          <a:noFill/>
+        </p:spPr>
+        <p:txBody>
+          <a:bodyPr wrap="none" rtlCol="0">
+            <a:spAutoFit/>
+          </a:bodyPr>
+          <a:lstStyle/>
+          <a:p>
+            <a:pPr algn="ctr"/>
+            <a:r>
+              <a:rPr lang="fr-FR" dirty="0" smtClean="0"/>
+              <a:t>Utilisé pour faire de la prédiction</a:t>
+            </a:r>
+            <a:endParaRPr lang="en-US" dirty="0"/>
+          </a:p>
+        </p:txBody>
+      </p:sp>
+      <p:sp>
+        <p:nvSpPr>
+          <p:cNvPr id="12" name="TextBox 11"/>
+          <p:cNvSpPr txBox="1"/>
+          <p:nvPr/>
+        </p:nvSpPr>
+        <p:spPr>
+          <a:xfrm>
+            <a:off x="403920" y="4332133"/>
+            <a:ext cx="4909677" cy="1200329"/>
+          </a:xfrm>
+          <a:prstGeom prst="rect">
+            <a:avLst/>
+          </a:prstGeom>
+          <a:noFill/>
+        </p:spPr>
+        <p:txBody>
+          <a:bodyPr wrap="none" rtlCol="0">
+            <a:spAutoFit/>
+          </a:bodyPr>
+          <a:lstStyle/>
+          <a:p>
+            <a:pPr algn="ctr"/>
+            <a:r>
+              <a:rPr lang="fr-FR" dirty="0" smtClean="0"/>
+              <a:t>Utilisé pour la modélisation</a:t>
+            </a:r>
+            <a:br>
+              <a:rPr lang="fr-FR" dirty="0" smtClean="0"/>
+            </a:br>
+            <a:r>
+              <a:rPr lang="fr-FR" dirty="0" smtClean="0"/>
+              <a:t>(validation croisée pour optimiser chaque modèle,</a:t>
+            </a:r>
+          </a:p>
+          <a:p>
+            <a:pPr algn="ctr"/>
+            <a:r>
+              <a:rPr lang="fr-FR" dirty="0" smtClean="0"/>
+              <a:t>Validation </a:t>
+            </a:r>
+            <a:r>
+              <a:rPr lang="fr-FR" dirty="0" err="1" smtClean="0"/>
+              <a:t>hold</a:t>
+            </a:r>
+            <a:r>
+              <a:rPr lang="fr-FR" dirty="0" smtClean="0"/>
+              <a:t> pour choisir le meilleur modèle)</a:t>
+            </a:r>
+            <a:br>
+              <a:rPr lang="fr-FR" dirty="0" smtClean="0"/>
+            </a:br>
+            <a:endParaRPr lang="en-US" dirty="0"/>
+          </a:p>
+        </p:txBody>
+      </p:sp>
     </p:spTree>
     <p:extLst>
       <p:ext uri="{BB962C8B-B14F-4D97-AF65-F5344CB8AC3E}">
@@ -8693,411 +10803,419 @@
           <a:p>
             <a:r>
               <a:rPr lang="fr-FR" dirty="0" smtClean="0"/>
-              <a:t>Stations étudiées</a:t>
+              <a:t>Modélisation</a:t>
             </a:r>
             <a:endParaRPr lang="en-US" dirty="0"/>
           </a:p>
         </p:txBody>
       </p:sp>
-      <p:graphicFrame>
-        <p:nvGraphicFramePr>
-          <p:cNvPr id="6" name="Object 5"/>
-          <p:cNvGraphicFramePr>
-            <a:graphicFrameLocks noChangeAspect="1"/>
-          </p:cNvGraphicFramePr>
+      <p:sp>
+        <p:nvSpPr>
+          <p:cNvPr id="3" name="Content Placeholder 2"/>
+          <p:cNvSpPr>
+            <a:spLocks noGrp="1"/>
+          </p:cNvSpPr>
           <p:nvPr>
-            <p:extLst>
-              <p:ext uri="{D42A27DB-BD31-4B8C-83A1-F6EECF244321}">
-                <p14:modId xmlns:p14="http://schemas.microsoft.com/office/powerpoint/2010/main" val="1483928682"/>
-              </p:ext>
-            </p:extLst>
+            <p:ph idx="1"/>
           </p:nvPr>
-        </p:nvGraphicFramePr>
-        <p:xfrm>
-          <a:off x="539552" y="1851670"/>
-          <a:ext cx="2447925" cy="1152525"/>
-        </p:xfrm>
-        <a:graphic>
-          <a:graphicData uri="http://schemas.openxmlformats.org/presentationml/2006/ole">
-            <mc:AlternateContent xmlns:mc="http://schemas.openxmlformats.org/markup-compatibility/2006">
-              <mc:Choice xmlns:v="urn:schemas-microsoft-com:vml" Requires="v">
-                <p:oleObj spid="_x0000_s1030" name="Worksheet" r:id="rId3" imgW="2447851" imgH="1152630" progId="Excel.Sheet.12">
-                  <p:embed/>
-                </p:oleObj>
-              </mc:Choice>
-              <mc:Fallback>
-                <p:oleObj name="Worksheet" r:id="rId3" imgW="2447851" imgH="1152630" progId="Excel.Sheet.12">
-                  <p:embed/>
-                  <p:pic>
-                    <p:nvPicPr>
-                      <p:cNvPr id="0" name=""/>
-                      <p:cNvPicPr/>
-                      <p:nvPr/>
-                    </p:nvPicPr>
-                    <p:blipFill>
-                      <a:blip r:embed="rId4"/>
-                      <a:stretch>
-                        <a:fillRect/>
-                      </a:stretch>
-                    </p:blipFill>
-                    <p:spPr>
-                      <a:xfrm>
-                        <a:off x="539552" y="1851670"/>
-                        <a:ext cx="2447925" cy="1152525"/>
-                      </a:xfrm>
-                      <a:prstGeom prst="rect">
-                        <a:avLst/>
-                      </a:prstGeom>
-                    </p:spPr>
-                  </p:pic>
-                </p:oleObj>
-              </mc:Fallback>
-            </mc:AlternateContent>
-          </a:graphicData>
-        </a:graphic>
-      </p:graphicFrame>
-      <p:graphicFrame>
-        <p:nvGraphicFramePr>
-          <p:cNvPr id="7" name="Object 6"/>
-          <p:cNvGraphicFramePr>
-            <a:graphicFrameLocks noChangeAspect="1"/>
-          </p:cNvGraphicFramePr>
-          <p:nvPr>
-            <p:extLst>
-              <p:ext uri="{D42A27DB-BD31-4B8C-83A1-F6EECF244321}">
-                <p14:modId xmlns:p14="http://schemas.microsoft.com/office/powerpoint/2010/main" val="3900466050"/>
-              </p:ext>
-            </p:extLst>
-          </p:nvPr>
-        </p:nvGraphicFramePr>
-        <p:xfrm>
-          <a:off x="3348038" y="2376488"/>
-          <a:ext cx="2447925" cy="390525"/>
-        </p:xfrm>
-        <a:graphic>
-          <a:graphicData uri="http://schemas.openxmlformats.org/presentationml/2006/ole">
-            <mc:AlternateContent xmlns:mc="http://schemas.openxmlformats.org/markup-compatibility/2006">
-              <mc:Choice xmlns:v="urn:schemas-microsoft-com:vml" Requires="v">
-                <p:oleObj spid="_x0000_s1031" name="Worksheet" r:id="rId5" imgW="2447851" imgH="390420" progId="Excel.Sheet.12">
-                  <p:embed/>
-                </p:oleObj>
-              </mc:Choice>
-              <mc:Fallback>
-                <p:oleObj name="Worksheet" r:id="rId5" imgW="2447851" imgH="390420" progId="Excel.Sheet.12">
-                  <p:embed/>
-                  <p:pic>
-                    <p:nvPicPr>
-                      <p:cNvPr id="0" name=""/>
-                      <p:cNvPicPr/>
-                      <p:nvPr/>
-                    </p:nvPicPr>
-                    <p:blipFill>
-                      <a:blip r:embed="rId6"/>
-                      <a:stretch>
-                        <a:fillRect/>
-                      </a:stretch>
-                    </p:blipFill>
-                    <p:spPr>
-                      <a:xfrm>
-                        <a:off x="3348038" y="2376488"/>
-                        <a:ext cx="2447925" cy="390525"/>
-                      </a:xfrm>
-                      <a:prstGeom prst="rect">
-                        <a:avLst/>
-                      </a:prstGeom>
-                    </p:spPr>
-                  </p:pic>
-                </p:oleObj>
-              </mc:Fallback>
-            </mc:AlternateContent>
-          </a:graphicData>
-        </a:graphic>
-      </p:graphicFrame>
-      <p:graphicFrame>
-        <p:nvGraphicFramePr>
-          <p:cNvPr id="8" name="Object 7"/>
-          <p:cNvGraphicFramePr>
-            <a:graphicFrameLocks noChangeAspect="1"/>
-          </p:cNvGraphicFramePr>
-          <p:nvPr>
-            <p:extLst>
-              <p:ext uri="{D42A27DB-BD31-4B8C-83A1-F6EECF244321}">
-                <p14:modId xmlns:p14="http://schemas.microsoft.com/office/powerpoint/2010/main" val="3024608846"/>
-              </p:ext>
-            </p:extLst>
-          </p:nvPr>
-        </p:nvGraphicFramePr>
-        <p:xfrm>
-          <a:off x="6084168" y="2355726"/>
-          <a:ext cx="2447925" cy="390525"/>
-        </p:xfrm>
-        <a:graphic>
-          <a:graphicData uri="http://schemas.openxmlformats.org/presentationml/2006/ole">
-            <mc:AlternateContent xmlns:mc="http://schemas.openxmlformats.org/markup-compatibility/2006">
-              <mc:Choice xmlns:v="urn:schemas-microsoft-com:vml" Requires="v">
-                <p:oleObj spid="_x0000_s1032" name="Worksheet" r:id="rId7" imgW="2447851" imgH="390420" progId="Excel.Sheet.12">
-                  <p:embed/>
-                </p:oleObj>
-              </mc:Choice>
-              <mc:Fallback>
-                <p:oleObj name="Worksheet" r:id="rId7" imgW="2447851" imgH="390420" progId="Excel.Sheet.12">
-                  <p:embed/>
-                  <p:pic>
-                    <p:nvPicPr>
-                      <p:cNvPr id="0" name=""/>
-                      <p:cNvPicPr/>
-                      <p:nvPr/>
-                    </p:nvPicPr>
-                    <p:blipFill>
-                      <a:blip r:embed="rId8"/>
-                      <a:stretch>
-                        <a:fillRect/>
-                      </a:stretch>
-                    </p:blipFill>
-                    <p:spPr>
-                      <a:xfrm>
-                        <a:off x="6084168" y="2355726"/>
-                        <a:ext cx="2447925" cy="390525"/>
-                      </a:xfrm>
-                      <a:prstGeom prst="rect">
-                        <a:avLst/>
-                      </a:prstGeom>
-                    </p:spPr>
-                  </p:pic>
-                </p:oleObj>
-              </mc:Fallback>
-            </mc:AlternateContent>
-          </a:graphicData>
-        </a:graphic>
-      </p:graphicFrame>
-      <p:sp>
-        <p:nvSpPr>
-          <p:cNvPr id="9" name="TextBox 8"/>
-          <p:cNvSpPr txBox="1"/>
-          <p:nvPr/>
-        </p:nvSpPr>
-        <p:spPr>
-          <a:xfrm>
-            <a:off x="519673" y="1059582"/>
-            <a:ext cx="1618264" cy="369332"/>
-          </a:xfrm>
-          <a:prstGeom prst="rect">
-            <a:avLst/>
-          </a:prstGeom>
-          <a:noFill/>
-        </p:spPr>
-        <p:txBody>
-          <a:bodyPr wrap="none" rtlCol="0">
-            <a:spAutoFit/>
+        </p:nvSpPr>
+        <p:spPr/>
+        <p:txBody>
+          <a:bodyPr>
+            <a:normAutofit lnSpcReduction="10000"/>
           </a:bodyPr>
           <a:lstStyle/>
           <a:p>
             <a:r>
-              <a:rPr lang="fr-FR" dirty="0" smtClean="0"/>
-              <a:t>À proximité de:</a:t>
-            </a:r>
-            <a:endParaRPr lang="en-US" dirty="0"/>
-          </a:p>
-        </p:txBody>
-      </p:sp>
-      <p:sp>
-        <p:nvSpPr>
-          <p:cNvPr id="10" name="TextBox 9"/>
-          <p:cNvSpPr txBox="1"/>
-          <p:nvPr/>
-        </p:nvSpPr>
-        <p:spPr>
-          <a:xfrm>
-            <a:off x="827584" y="1441282"/>
-            <a:ext cx="1865704" cy="369332"/>
-          </a:xfrm>
-          <a:prstGeom prst="rect">
-            <a:avLst/>
-          </a:prstGeom>
-          <a:noFill/>
-        </p:spPr>
-        <p:txBody>
-          <a:bodyPr wrap="none" rtlCol="0">
-            <a:spAutoFit/>
-          </a:bodyPr>
-          <a:lstStyle/>
-          <a:p>
-            <a:r>
-              <a:rPr lang="fr-FR" dirty="0" smtClean="0"/>
-              <a:t>8, bd Saint Michel</a:t>
-            </a:r>
-            <a:endParaRPr lang="en-US" dirty="0"/>
-          </a:p>
-        </p:txBody>
-      </p:sp>
-      <p:sp>
-        <p:nvSpPr>
-          <p:cNvPr id="11" name="TextBox 10"/>
-          <p:cNvSpPr txBox="1"/>
-          <p:nvPr/>
-        </p:nvSpPr>
-        <p:spPr>
-          <a:xfrm>
-            <a:off x="3563888" y="1441282"/>
-            <a:ext cx="2021131" cy="369332"/>
-          </a:xfrm>
-          <a:prstGeom prst="rect">
-            <a:avLst/>
-          </a:prstGeom>
-          <a:noFill/>
-        </p:spPr>
-        <p:txBody>
-          <a:bodyPr wrap="none" rtlCol="0">
-            <a:spAutoFit/>
-          </a:bodyPr>
-          <a:lstStyle/>
-          <a:p>
-            <a:r>
-              <a:rPr lang="fr-FR" dirty="0" smtClean="0"/>
-              <a:t>88, rue de la </a:t>
-            </a:r>
-            <a:r>
-              <a:rPr lang="fr-FR" dirty="0" err="1" smtClean="0"/>
-              <a:t>Vilette</a:t>
-            </a:r>
-            <a:endParaRPr lang="en-US" dirty="0"/>
-          </a:p>
-        </p:txBody>
-      </p:sp>
-      <p:sp>
-        <p:nvSpPr>
-          <p:cNvPr id="12" name="TextBox 11"/>
-          <p:cNvSpPr txBox="1"/>
-          <p:nvPr/>
-        </p:nvSpPr>
-        <p:spPr>
-          <a:xfrm>
-            <a:off x="6310600" y="1410330"/>
-            <a:ext cx="1357744" cy="369332"/>
-          </a:xfrm>
-          <a:prstGeom prst="rect">
-            <a:avLst/>
-          </a:prstGeom>
-          <a:noFill/>
-        </p:spPr>
-        <p:txBody>
-          <a:bodyPr wrap="none" rtlCol="0">
-            <a:spAutoFit/>
-          </a:bodyPr>
-          <a:lstStyle/>
-          <a:p>
-            <a:r>
-              <a:rPr lang="fr-FR" dirty="0" err="1" smtClean="0"/>
-              <a:t>MontMartre</a:t>
-            </a:r>
-            <a:endParaRPr lang="en-US" dirty="0"/>
-          </a:p>
-        </p:txBody>
-      </p:sp>
-      <p:graphicFrame>
-        <p:nvGraphicFramePr>
-          <p:cNvPr id="13" name="Object 12"/>
-          <p:cNvGraphicFramePr>
-            <a:graphicFrameLocks noChangeAspect="1"/>
-          </p:cNvGraphicFramePr>
-          <p:nvPr>
-            <p:extLst>
-              <p:ext uri="{D42A27DB-BD31-4B8C-83A1-F6EECF244321}">
-                <p14:modId xmlns:p14="http://schemas.microsoft.com/office/powerpoint/2010/main" val="2074598280"/>
-              </p:ext>
-            </p:extLst>
-          </p:nvPr>
-        </p:nvGraphicFramePr>
-        <p:xfrm>
-          <a:off x="536473" y="3723878"/>
-          <a:ext cx="2447925" cy="771525"/>
-        </p:xfrm>
-        <a:graphic>
-          <a:graphicData uri="http://schemas.openxmlformats.org/presentationml/2006/ole">
-            <mc:AlternateContent xmlns:mc="http://schemas.openxmlformats.org/markup-compatibility/2006">
-              <mc:Choice xmlns:v="urn:schemas-microsoft-com:vml" Requires="v">
-                <p:oleObj spid="_x0000_s1033" name="Worksheet" r:id="rId9" imgW="2447851" imgH="771660" progId="Excel.Sheet.12">
-                  <p:embed/>
-                </p:oleObj>
-              </mc:Choice>
-              <mc:Fallback>
-                <p:oleObj name="Worksheet" r:id="rId9" imgW="2447851" imgH="771660" progId="Excel.Sheet.12">
-                  <p:embed/>
-                  <p:pic>
-                    <p:nvPicPr>
-                      <p:cNvPr id="0" name=""/>
-                      <p:cNvPicPr/>
-                      <p:nvPr/>
-                    </p:nvPicPr>
-                    <p:blipFill>
-                      <a:blip r:embed="rId10"/>
-                      <a:stretch>
-                        <a:fillRect/>
-                      </a:stretch>
-                    </p:blipFill>
-                    <p:spPr>
-                      <a:xfrm>
-                        <a:off x="536473" y="3723878"/>
-                        <a:ext cx="2447925" cy="771525"/>
-                      </a:xfrm>
-                      <a:prstGeom prst="rect">
-                        <a:avLst/>
-                      </a:prstGeom>
-                    </p:spPr>
-                  </p:pic>
-                </p:oleObj>
-              </mc:Fallback>
-            </mc:AlternateContent>
-          </a:graphicData>
-        </a:graphic>
-      </p:graphicFrame>
-      <p:sp>
-        <p:nvSpPr>
-          <p:cNvPr id="14" name="TextBox 13"/>
-          <p:cNvSpPr txBox="1"/>
-          <p:nvPr/>
-        </p:nvSpPr>
-        <p:spPr>
-          <a:xfrm>
-            <a:off x="827584" y="3291830"/>
-            <a:ext cx="1452898" cy="369332"/>
-          </a:xfrm>
-          <a:prstGeom prst="rect">
-            <a:avLst/>
-          </a:prstGeom>
-          <a:noFill/>
-        </p:spPr>
-        <p:txBody>
-          <a:bodyPr wrap="none" rtlCol="0">
-            <a:spAutoFit/>
-          </a:bodyPr>
-          <a:lstStyle/>
-          <a:p>
-            <a:r>
-              <a:rPr lang="fr-FR" dirty="0" smtClean="0"/>
-              <a:t>Gare du Nord</a:t>
-            </a:r>
-            <a:endParaRPr lang="en-US" dirty="0"/>
+              <a:rPr lang="fr-FR" sz="2000" b="1" u="sng" dirty="0" smtClean="0"/>
+              <a:t>Classification binaire:  </a:t>
+            </a:r>
+            <a:r>
+              <a:rPr lang="fr-FR" sz="2000" dirty="0" smtClean="0"/>
+              <a:t>Y= 1 si V&gt;seuil, 0 sinon, où V est le nombre de </a:t>
+            </a:r>
+            <a:r>
+              <a:rPr lang="fr-FR" sz="2000" dirty="0" err="1" smtClean="0"/>
+              <a:t>vélibs</a:t>
+            </a:r>
+            <a:r>
+              <a:rPr lang="fr-FR" sz="2000" dirty="0" smtClean="0"/>
+              <a:t> </a:t>
+            </a:r>
+            <a:r>
+              <a:rPr lang="fr-FR" sz="2000" dirty="0"/>
+              <a:t>disponibles (</a:t>
+            </a:r>
+            <a:r>
+              <a:rPr lang="fr-FR" sz="2000" dirty="0" err="1"/>
+              <a:t>available_bikes</a:t>
+            </a:r>
+            <a:r>
+              <a:rPr lang="fr-FR" sz="2000" dirty="0"/>
+              <a:t>) ou </a:t>
+            </a:r>
+            <a:r>
+              <a:rPr lang="fr-FR" sz="2000" dirty="0" smtClean="0"/>
+              <a:t>le nombre de </a:t>
+            </a:r>
+            <a:r>
+              <a:rPr lang="fr-FR" sz="2000" dirty="0"/>
+              <a:t>places disponibles (</a:t>
+            </a:r>
+            <a:r>
+              <a:rPr lang="fr-FR" sz="2000" dirty="0" err="1"/>
+              <a:t>available_stands</a:t>
+            </a:r>
+            <a:r>
+              <a:rPr lang="fr-FR" sz="2000" dirty="0" smtClean="0"/>
+              <a:t>)</a:t>
+            </a:r>
+          </a:p>
+          <a:p>
+            <a:endParaRPr lang="fr-FR" sz="2000" dirty="0"/>
+          </a:p>
+          <a:p>
+            <a:r>
+              <a:rPr lang="fr-FR" sz="2000" b="1" u="sng" dirty="0" smtClean="0"/>
+              <a:t>5 approches:</a:t>
+            </a:r>
+          </a:p>
+          <a:p>
+            <a:pPr lvl="1"/>
+            <a:r>
+              <a:rPr lang="fr-FR" sz="1800" dirty="0" smtClean="0"/>
+              <a:t>Forêts aléatoires (package </a:t>
+            </a:r>
+            <a:r>
+              <a:rPr lang="fr-FR" sz="1800" dirty="0" err="1" smtClean="0"/>
+              <a:t>RandomForest</a:t>
+            </a:r>
+            <a:r>
+              <a:rPr lang="fr-FR" sz="1800" dirty="0" smtClean="0"/>
+              <a:t>)</a:t>
+            </a:r>
+          </a:p>
+          <a:p>
+            <a:pPr lvl="1"/>
+            <a:r>
+              <a:rPr lang="fr-FR" sz="1800" dirty="0" smtClean="0"/>
+              <a:t>Régressions pénalisées (package </a:t>
+            </a:r>
+            <a:r>
+              <a:rPr lang="fr-FR" sz="1800" dirty="0" err="1" smtClean="0"/>
+              <a:t>glmnet</a:t>
+            </a:r>
+            <a:r>
+              <a:rPr lang="fr-FR" sz="1800" dirty="0" smtClean="0"/>
+              <a:t>)</a:t>
+            </a:r>
+          </a:p>
+          <a:p>
+            <a:pPr lvl="1"/>
+            <a:r>
+              <a:rPr lang="fr-FR" sz="1800" dirty="0" smtClean="0"/>
+              <a:t>Support à Vecteur de Machine (package e1071)</a:t>
+            </a:r>
+          </a:p>
+          <a:p>
+            <a:pPr lvl="1"/>
+            <a:r>
+              <a:rPr lang="fr-FR" sz="1800" dirty="0" smtClean="0"/>
+              <a:t>Gradient </a:t>
+            </a:r>
+            <a:r>
+              <a:rPr lang="fr-FR" sz="1800" dirty="0" err="1" smtClean="0"/>
+              <a:t>Boosting</a:t>
+            </a:r>
+            <a:r>
+              <a:rPr lang="fr-FR" sz="1800" dirty="0" smtClean="0"/>
+              <a:t> </a:t>
+            </a:r>
+            <a:r>
+              <a:rPr lang="fr-FR" sz="1800" dirty="0" err="1" smtClean="0"/>
+              <a:t>Tree</a:t>
+            </a:r>
+            <a:r>
+              <a:rPr lang="fr-FR" sz="1800" dirty="0" smtClean="0"/>
+              <a:t> (package </a:t>
+            </a:r>
+            <a:r>
+              <a:rPr lang="fr-FR" sz="1800" dirty="0" err="1" smtClean="0"/>
+              <a:t>gbm</a:t>
+            </a:r>
+            <a:r>
+              <a:rPr lang="fr-FR" sz="1800" dirty="0" smtClean="0"/>
+              <a:t>)</a:t>
+            </a:r>
+          </a:p>
+          <a:p>
+            <a:pPr lvl="1"/>
+            <a:r>
+              <a:rPr lang="fr-FR" sz="1800" dirty="0" smtClean="0"/>
+              <a:t>Régression classique (package </a:t>
+            </a:r>
+            <a:r>
+              <a:rPr lang="fr-FR" sz="1800" dirty="0" err="1" smtClean="0"/>
+              <a:t>bestglm</a:t>
+            </a:r>
+            <a:r>
+              <a:rPr lang="fr-FR" sz="1800" dirty="0" smtClean="0"/>
+              <a:t>) </a:t>
+            </a:r>
+            <a:r>
+              <a:rPr lang="fr-FR" sz="1800" dirty="0" smtClean="0">
+                <a:sym typeface="Wingdings" panose="05000000000000000000" pitchFamily="2" charset="2"/>
+              </a:rPr>
+              <a:t> réduction du nombre de dimension arbitraire</a:t>
+            </a:r>
+            <a:endParaRPr lang="en-US" sz="1800" dirty="0"/>
           </a:p>
         </p:txBody>
       </p:sp>
     </p:spTree>
     <p:extLst>
       <p:ext uri="{BB962C8B-B14F-4D97-AF65-F5344CB8AC3E}">
-        <p14:creationId xmlns:p14="http://schemas.microsoft.com/office/powerpoint/2010/main" val="3416802583"/>
+        <p14:creationId xmlns:p14="http://schemas.microsoft.com/office/powerpoint/2010/main" val="4216833367"/>
       </p:ext>
     </p:extLst>
   </p:cSld>
   <p:clrMapOvr>
     <a:masterClrMapping/>
   </p:clrMapOvr>
-  <p:timing>
-    <p:tnLst>
-      <p:par>
-        <p:cTn id="1" dur="indefinite" restart="never" nodeType="tmRoot"/>
-      </p:par>
-    </p:tnLst>
-  </p:timing>
+</p:sld>
+</file>
+
+<file path=ppt/slides/slide9.xml><?xml version="1.0" encoding="utf-8"?>
+<p:sld xmlns:a="http://schemas.openxmlformats.org/drawingml/2006/main" xmlns:r="http://schemas.openxmlformats.org/officeDocument/2006/relationships" xmlns:p="http://schemas.openxmlformats.org/presentationml/2006/main">
+  <p:cSld>
+    <p:spTree>
+      <p:nvGrpSpPr>
+        <p:cNvPr id="1" name=""/>
+        <p:cNvGrpSpPr/>
+        <p:nvPr/>
+      </p:nvGrpSpPr>
+      <p:grpSpPr>
+        <a:xfrm>
+          <a:off x="0" y="0"/>
+          <a:ext cx="0" cy="0"/>
+          <a:chOff x="0" y="0"/>
+          <a:chExt cx="0" cy="0"/>
+        </a:xfrm>
+      </p:grpSpPr>
+      <p:sp>
+        <p:nvSpPr>
+          <p:cNvPr id="2" name="Title 1"/>
+          <p:cNvSpPr>
+            <a:spLocks noGrp="1"/>
+          </p:cNvSpPr>
+          <p:nvPr>
+            <p:ph type="title"/>
+          </p:nvPr>
+        </p:nvSpPr>
+        <p:spPr/>
+        <p:txBody>
+          <a:bodyPr/>
+          <a:lstStyle/>
+          <a:p>
+            <a:r>
+              <a:rPr lang="fr-FR" dirty="0" smtClean="0"/>
+              <a:t>Modélisation</a:t>
+            </a:r>
+            <a:endParaRPr lang="en-US" dirty="0"/>
+          </a:p>
+        </p:txBody>
+      </p:sp>
+      <p:sp>
+        <p:nvSpPr>
+          <p:cNvPr id="3" name="Content Placeholder 2"/>
+          <p:cNvSpPr>
+            <a:spLocks noGrp="1"/>
+          </p:cNvSpPr>
+          <p:nvPr>
+            <p:ph idx="1"/>
+          </p:nvPr>
+        </p:nvSpPr>
+        <p:spPr/>
+        <p:txBody>
+          <a:bodyPr>
+            <a:normAutofit fontScale="85000" lnSpcReduction="10000"/>
+          </a:bodyPr>
+          <a:lstStyle/>
+          <a:p>
+            <a:r>
+              <a:rPr lang="fr-FR" dirty="0" smtClean="0"/>
+              <a:t>Une unique fonction </a:t>
+            </a:r>
+            <a:r>
+              <a:rPr lang="fr-FR" dirty="0" err="1" smtClean="0"/>
+              <a:t>paramètrable</a:t>
+            </a:r>
+            <a:r>
+              <a:rPr lang="fr-FR" dirty="0" smtClean="0"/>
+              <a:t> qui implémente tous les modèles</a:t>
+            </a:r>
+          </a:p>
+          <a:p>
+            <a:endParaRPr lang="fr-FR" dirty="0" smtClean="0"/>
+          </a:p>
+          <a:p>
+            <a:pPr marL="0" indent="0">
+              <a:buNone/>
+            </a:pPr>
+            <a:r>
+              <a:rPr lang="en-US" dirty="0" err="1" smtClean="0">
+                <a:latin typeface="Arial Rounded MT Bold" panose="020F0704030504030204" pitchFamily="34" charset="0"/>
+              </a:rPr>
+              <a:t>Velib.Modelisation</a:t>
+            </a:r>
+            <a:r>
+              <a:rPr lang="en-US" dirty="0" smtClean="0">
+                <a:latin typeface="Arial Rounded MT Bold" panose="020F0704030504030204" pitchFamily="34" charset="0"/>
+              </a:rPr>
+              <a:t> (</a:t>
+            </a:r>
+            <a:r>
+              <a:rPr lang="en-US" dirty="0">
+                <a:latin typeface="Arial Rounded MT Bold" panose="020F0704030504030204" pitchFamily="34" charset="0"/>
+              </a:rPr>
+              <a:t>data</a:t>
+            </a:r>
+            <a:r>
+              <a:rPr lang="en-US" dirty="0" smtClean="0">
+                <a:latin typeface="Arial Rounded MT Bold" panose="020F0704030504030204" pitchFamily="34" charset="0"/>
+              </a:rPr>
+              <a:t>, </a:t>
+            </a:r>
+            <a:r>
+              <a:rPr lang="en-US" dirty="0" err="1" smtClean="0">
+                <a:latin typeface="Arial Rounded MT Bold" panose="020F0704030504030204" pitchFamily="34" charset="0"/>
+              </a:rPr>
+              <a:t>target_type</a:t>
+            </a:r>
+            <a:r>
+              <a:rPr lang="en-US" dirty="0">
+                <a:latin typeface="Arial Rounded MT Bold" panose="020F0704030504030204" pitchFamily="34" charset="0"/>
+              </a:rPr>
+              <a:t>="bikes</a:t>
+            </a:r>
+            <a:r>
+              <a:rPr lang="en-US" dirty="0" smtClean="0">
+                <a:latin typeface="Arial Rounded MT Bold" panose="020F0704030504030204" pitchFamily="34" charset="0"/>
+              </a:rPr>
+              <a:t>", threshold=5, </a:t>
+            </a:r>
+            <a:r>
+              <a:rPr lang="en-US" dirty="0" err="1" smtClean="0">
+                <a:latin typeface="Arial Rounded MT Bold" panose="020F0704030504030204" pitchFamily="34" charset="0"/>
+              </a:rPr>
+              <a:t>model_family</a:t>
+            </a:r>
+            <a:r>
+              <a:rPr lang="en-US" dirty="0">
+                <a:latin typeface="Arial Rounded MT Bold" panose="020F0704030504030204" pitchFamily="34" charset="0"/>
+              </a:rPr>
+              <a:t>="binomial</a:t>
+            </a:r>
+            <a:r>
+              <a:rPr lang="en-US" dirty="0" smtClean="0">
+                <a:latin typeface="Arial Rounded MT Bold" panose="020F0704030504030204" pitchFamily="34" charset="0"/>
+              </a:rPr>
+              <a:t>", ratio=0.5, symmetric=FALSE, </a:t>
+            </a:r>
+            <a:r>
+              <a:rPr lang="en-US" dirty="0" err="1" smtClean="0">
+                <a:latin typeface="Arial Rounded MT Bold" panose="020F0704030504030204" pitchFamily="34" charset="0"/>
+              </a:rPr>
+              <a:t>model_type</a:t>
+            </a:r>
+            <a:r>
+              <a:rPr lang="en-US" dirty="0">
+                <a:latin typeface="Arial Rounded MT Bold" panose="020F0704030504030204" pitchFamily="34" charset="0"/>
+              </a:rPr>
+              <a:t>="</a:t>
+            </a:r>
+            <a:r>
+              <a:rPr lang="en-US" dirty="0" err="1">
+                <a:latin typeface="Arial Rounded MT Bold" panose="020F0704030504030204" pitchFamily="34" charset="0"/>
+              </a:rPr>
+              <a:t>rf</a:t>
+            </a:r>
+            <a:r>
+              <a:rPr lang="en-US" dirty="0" smtClean="0">
+                <a:latin typeface="Arial Rounded MT Bold" panose="020F0704030504030204" pitchFamily="34" charset="0"/>
+              </a:rPr>
+              <a:t>", alpha=0.5, kernel</a:t>
+            </a:r>
+            <a:r>
+              <a:rPr lang="en-US" dirty="0">
+                <a:latin typeface="Arial Rounded MT Bold" panose="020F0704030504030204" pitchFamily="34" charset="0"/>
+              </a:rPr>
+              <a:t>="radial</a:t>
+            </a:r>
+            <a:r>
+              <a:rPr lang="en-US" dirty="0" smtClean="0">
+                <a:latin typeface="Arial Rounded MT Bold" panose="020F0704030504030204" pitchFamily="34" charset="0"/>
+              </a:rPr>
+              <a:t>", cost=c(</a:t>
+            </a:r>
+            <a:r>
+              <a:rPr lang="en-US" dirty="0" err="1" smtClean="0">
+                <a:latin typeface="Arial Rounded MT Bold" panose="020F0704030504030204" pitchFamily="34" charset="0"/>
+              </a:rPr>
+              <a:t>seq</a:t>
+            </a:r>
+            <a:r>
+              <a:rPr lang="en-US" dirty="0" smtClean="0">
+                <a:latin typeface="Arial Rounded MT Bold" panose="020F0704030504030204" pitchFamily="34" charset="0"/>
+              </a:rPr>
+              <a:t>(1,10)), gamma </a:t>
+            </a:r>
+            <a:r>
+              <a:rPr lang="en-US" dirty="0">
+                <a:latin typeface="Arial Rounded MT Bold" panose="020F0704030504030204" pitchFamily="34" charset="0"/>
+              </a:rPr>
+              <a:t>= NULL</a:t>
+            </a:r>
+            <a:r>
+              <a:rPr lang="en-US" dirty="0" smtClean="0">
+                <a:latin typeface="Arial Rounded MT Bold" panose="020F0704030504030204" pitchFamily="34" charset="0"/>
+              </a:rPr>
+              <a:t>, </a:t>
+            </a:r>
+            <a:r>
+              <a:rPr lang="en-US" dirty="0" err="1" smtClean="0">
+                <a:latin typeface="Arial Rounded MT Bold" panose="020F0704030504030204" pitchFamily="34" charset="0"/>
+              </a:rPr>
+              <a:t>n.trees</a:t>
+            </a:r>
+            <a:r>
+              <a:rPr lang="en-US" dirty="0" smtClean="0">
+                <a:latin typeface="Arial Rounded MT Bold" panose="020F0704030504030204" pitchFamily="34" charset="0"/>
+              </a:rPr>
+              <a:t>=4000)</a:t>
+            </a:r>
+            <a:endParaRPr lang="en-US" dirty="0">
+              <a:latin typeface="Arial Rounded MT Bold" panose="020F0704030504030204" pitchFamily="34" charset="0"/>
+            </a:endParaRPr>
+          </a:p>
+          <a:p>
+            <a:pPr marL="0" indent="0">
+              <a:buNone/>
+            </a:pPr>
+            <a:endParaRPr lang="en-US" dirty="0"/>
+          </a:p>
+        </p:txBody>
+      </p:sp>
+    </p:spTree>
+    <p:extLst>
+      <p:ext uri="{BB962C8B-B14F-4D97-AF65-F5344CB8AC3E}">
+        <p14:creationId xmlns:p14="http://schemas.microsoft.com/office/powerpoint/2010/main" val="1575960415"/>
+      </p:ext>
+    </p:extLst>
+  </p:cSld>
+  <p:clrMapOvr>
+    <a:masterClrMapping/>
+  </p:clrMapOvr>
 </p:sld>
 </file>
 

</xml_diff>